<commit_message>
Fix: BP_Hunter1Character interaction sync error
- Add BP_NewHunterCharacter to fix interaction sync error when changing character.

- Fix c,d area jump platform interaction issue.

- Increased object spawner and door panel interaction time.
</commit_message>
<xml_diff>
--- a/fbx/이미지자료/프레젠테이션1.pptx
+++ b/fbx/이미지자료/프레젠테이션1.pptx
@@ -5,7 +5,7 @@
     <p:sldMasterId id="2147483648" r:id="rId1"/>
   </p:sldMasterIdLst>
   <p:notesMasterIdLst>
-    <p:notesMasterId r:id="rId8"/>
+    <p:notesMasterId r:id="rId7"/>
   </p:notesMasterIdLst>
   <p:sldIdLst>
     <p:sldId id="256" r:id="rId2"/>
@@ -13,7 +13,6 @@
     <p:sldId id="258" r:id="rId4"/>
     <p:sldId id="263" r:id="rId5"/>
     <p:sldId id="261" r:id="rId6"/>
-    <p:sldId id="260" r:id="rId7"/>
   </p:sldIdLst>
   <p:sldSz cx="12192000" cy="6858000"/>
   <p:notesSz cx="6858000" cy="9144000"/>
@@ -202,7 +201,7 @@
           <a:p>
             <a:fld id="{89997270-8296-4DE5-B75B-12F7EBA9C4B5}" type="datetimeFigureOut">
               <a:rPr lang="ko-KR" altLang="en-US" smtClean="0"/>
-              <a:t>2024-07-22</a:t>
+              <a:t>2024-09-09</a:t>
             </a:fld>
             <a:endParaRPr lang="ko-KR" altLang="en-US"/>
           </a:p>
@@ -700,7 +699,7 @@
           <a:p>
             <a:fld id="{371CAEE5-DC20-474E-B160-61CE0108DED8}" type="datetimeFigureOut">
               <a:rPr lang="ko-KR" altLang="en-US" smtClean="0"/>
-              <a:t>2024-07-22</a:t>
+              <a:t>2024-09-09</a:t>
             </a:fld>
             <a:endParaRPr lang="ko-KR" altLang="en-US"/>
           </a:p>
@@ -898,7 +897,7 @@
           <a:p>
             <a:fld id="{371CAEE5-DC20-474E-B160-61CE0108DED8}" type="datetimeFigureOut">
               <a:rPr lang="ko-KR" altLang="en-US" smtClean="0"/>
-              <a:t>2024-07-22</a:t>
+              <a:t>2024-09-09</a:t>
             </a:fld>
             <a:endParaRPr lang="ko-KR" altLang="en-US"/>
           </a:p>
@@ -1106,7 +1105,7 @@
           <a:p>
             <a:fld id="{371CAEE5-DC20-474E-B160-61CE0108DED8}" type="datetimeFigureOut">
               <a:rPr lang="ko-KR" altLang="en-US" smtClean="0"/>
-              <a:t>2024-07-22</a:t>
+              <a:t>2024-09-09</a:t>
             </a:fld>
             <a:endParaRPr lang="ko-KR" altLang="en-US"/>
           </a:p>
@@ -1304,7 +1303,7 @@
           <a:p>
             <a:fld id="{371CAEE5-DC20-474E-B160-61CE0108DED8}" type="datetimeFigureOut">
               <a:rPr lang="ko-KR" altLang="en-US" smtClean="0"/>
-              <a:t>2024-07-22</a:t>
+              <a:t>2024-09-09</a:t>
             </a:fld>
             <a:endParaRPr lang="ko-KR" altLang="en-US"/>
           </a:p>
@@ -1579,7 +1578,7 @@
           <a:p>
             <a:fld id="{371CAEE5-DC20-474E-B160-61CE0108DED8}" type="datetimeFigureOut">
               <a:rPr lang="ko-KR" altLang="en-US" smtClean="0"/>
-              <a:t>2024-07-22</a:t>
+              <a:t>2024-09-09</a:t>
             </a:fld>
             <a:endParaRPr lang="ko-KR" altLang="en-US"/>
           </a:p>
@@ -1844,7 +1843,7 @@
           <a:p>
             <a:fld id="{371CAEE5-DC20-474E-B160-61CE0108DED8}" type="datetimeFigureOut">
               <a:rPr lang="ko-KR" altLang="en-US" smtClean="0"/>
-              <a:t>2024-07-22</a:t>
+              <a:t>2024-09-09</a:t>
             </a:fld>
             <a:endParaRPr lang="ko-KR" altLang="en-US"/>
           </a:p>
@@ -2256,7 +2255,7 @@
           <a:p>
             <a:fld id="{371CAEE5-DC20-474E-B160-61CE0108DED8}" type="datetimeFigureOut">
               <a:rPr lang="ko-KR" altLang="en-US" smtClean="0"/>
-              <a:t>2024-07-22</a:t>
+              <a:t>2024-09-09</a:t>
             </a:fld>
             <a:endParaRPr lang="ko-KR" altLang="en-US"/>
           </a:p>
@@ -2397,7 +2396,7 @@
           <a:p>
             <a:fld id="{371CAEE5-DC20-474E-B160-61CE0108DED8}" type="datetimeFigureOut">
               <a:rPr lang="ko-KR" altLang="en-US" smtClean="0"/>
-              <a:t>2024-07-22</a:t>
+              <a:t>2024-09-09</a:t>
             </a:fld>
             <a:endParaRPr lang="ko-KR" altLang="en-US"/>
           </a:p>
@@ -2510,7 +2509,7 @@
           <a:p>
             <a:fld id="{371CAEE5-DC20-474E-B160-61CE0108DED8}" type="datetimeFigureOut">
               <a:rPr lang="ko-KR" altLang="en-US" smtClean="0"/>
-              <a:t>2024-07-22</a:t>
+              <a:t>2024-09-09</a:t>
             </a:fld>
             <a:endParaRPr lang="ko-KR" altLang="en-US"/>
           </a:p>
@@ -2821,7 +2820,7 @@
           <a:p>
             <a:fld id="{371CAEE5-DC20-474E-B160-61CE0108DED8}" type="datetimeFigureOut">
               <a:rPr lang="ko-KR" altLang="en-US" smtClean="0"/>
-              <a:t>2024-07-22</a:t>
+              <a:t>2024-09-09</a:t>
             </a:fld>
             <a:endParaRPr lang="ko-KR" altLang="en-US"/>
           </a:p>
@@ -3109,7 +3108,7 @@
           <a:p>
             <a:fld id="{371CAEE5-DC20-474E-B160-61CE0108DED8}" type="datetimeFigureOut">
               <a:rPr lang="ko-KR" altLang="en-US" smtClean="0"/>
-              <a:t>2024-07-22</a:t>
+              <a:t>2024-09-09</a:t>
             </a:fld>
             <a:endParaRPr lang="ko-KR" altLang="en-US"/>
           </a:p>
@@ -3350,7 +3349,7 @@
           <a:p>
             <a:fld id="{371CAEE5-DC20-474E-B160-61CE0108DED8}" type="datetimeFigureOut">
               <a:rPr lang="ko-KR" altLang="en-US" smtClean="0"/>
-              <a:t>2024-07-22</a:t>
+              <a:t>2024-09-09</a:t>
             </a:fld>
             <a:endParaRPr lang="ko-KR" altLang="en-US"/>
           </a:p>
@@ -3769,10 +3768,10 @@
       </p:grpSpPr>
       <p:sp>
         <p:nvSpPr>
-          <p:cNvPr id="4" name="직사각형 3">
-            <a:extLst>
-              <a:ext uri="{FF2B5EF4-FFF2-40B4-BE49-F238E27FC236}">
-                <a16:creationId xmlns:a16="http://schemas.microsoft.com/office/drawing/2014/main" id="{060F7D6E-A24F-CC4C-17CC-0788A64EA00C}"/>
+          <p:cNvPr id="33" name="직사각형 32">
+            <a:extLst>
+              <a:ext uri="{FF2B5EF4-FFF2-40B4-BE49-F238E27FC236}">
+                <a16:creationId xmlns:a16="http://schemas.microsoft.com/office/drawing/2014/main" id="{1A3EE0E6-4EA8-15C5-745E-E30926A77A4E}"/>
               </a:ext>
             </a:extLst>
           </p:cNvPr>
@@ -3780,8 +3779,541 @@
           <p:nvPr/>
         </p:nvSpPr>
         <p:spPr>
-          <a:xfrm>
-            <a:off x="2006199" y="4918224"/>
+          <a:xfrm rot="5400000" flipV="1">
+            <a:off x="2418662" y="3280192"/>
+            <a:ext cx="3108005" cy="168061"/>
+          </a:xfrm>
+          <a:prstGeom prst="rect">
+            <a:avLst/>
+          </a:prstGeom>
+          <a:ln>
+            <a:noFill/>
+          </a:ln>
+        </p:spPr>
+        <p:style>
+          <a:lnRef idx="2">
+            <a:schemeClr val="accent1">
+              <a:shade val="15000"/>
+            </a:schemeClr>
+          </a:lnRef>
+          <a:fillRef idx="1">
+            <a:schemeClr val="accent1"/>
+          </a:fillRef>
+          <a:effectRef idx="0">
+            <a:schemeClr val="accent1"/>
+          </a:effectRef>
+          <a:fontRef idx="minor">
+            <a:schemeClr val="lt1"/>
+          </a:fontRef>
+        </p:style>
+        <p:txBody>
+          <a:bodyPr rtlCol="0" anchor="ctr"/>
+          <a:lstStyle/>
+          <a:p>
+            <a:pPr algn="ctr"/>
+            <a:endParaRPr lang="ko-KR" altLang="en-US"/>
+          </a:p>
+        </p:txBody>
+      </p:sp>
+      <p:sp>
+        <p:nvSpPr>
+          <p:cNvPr id="34" name="직사각형 33">
+            <a:extLst>
+              <a:ext uri="{FF2B5EF4-FFF2-40B4-BE49-F238E27FC236}">
+                <a16:creationId xmlns:a16="http://schemas.microsoft.com/office/drawing/2014/main" id="{0E65E258-1B3E-A77B-0B73-9782693F11BE}"/>
+              </a:ext>
+            </a:extLst>
+          </p:cNvPr>
+          <p:cNvSpPr/>
+          <p:nvPr/>
+        </p:nvSpPr>
+        <p:spPr>
+          <a:xfrm rot="5400000" flipV="1">
+            <a:off x="830230" y="3355068"/>
+            <a:ext cx="1074586" cy="141610"/>
+          </a:xfrm>
+          <a:prstGeom prst="rect">
+            <a:avLst/>
+          </a:prstGeom>
+          <a:ln>
+            <a:noFill/>
+          </a:ln>
+        </p:spPr>
+        <p:style>
+          <a:lnRef idx="2">
+            <a:schemeClr val="accent1">
+              <a:shade val="15000"/>
+            </a:schemeClr>
+          </a:lnRef>
+          <a:fillRef idx="1">
+            <a:schemeClr val="accent1"/>
+          </a:fillRef>
+          <a:effectRef idx="0">
+            <a:schemeClr val="accent1"/>
+          </a:effectRef>
+          <a:fontRef idx="minor">
+            <a:schemeClr val="lt1"/>
+          </a:fontRef>
+        </p:style>
+        <p:txBody>
+          <a:bodyPr rtlCol="0" anchor="ctr"/>
+          <a:lstStyle/>
+          <a:p>
+            <a:pPr algn="ctr"/>
+            <a:endParaRPr lang="ko-KR" altLang="en-US"/>
+          </a:p>
+        </p:txBody>
+      </p:sp>
+      <p:sp>
+        <p:nvSpPr>
+          <p:cNvPr id="27" name="직사각형 26">
+            <a:extLst>
+              <a:ext uri="{FF2B5EF4-FFF2-40B4-BE49-F238E27FC236}">
+                <a16:creationId xmlns:a16="http://schemas.microsoft.com/office/drawing/2014/main" id="{BDCF82A1-0D95-2D34-0806-36EAE1A18294}"/>
+              </a:ext>
+            </a:extLst>
+          </p:cNvPr>
+          <p:cNvSpPr/>
+          <p:nvPr/>
+        </p:nvSpPr>
+        <p:spPr>
+          <a:xfrm rot="5400000" flipV="1">
+            <a:off x="3104360" y="2493216"/>
+            <a:ext cx="168658" cy="3266330"/>
+          </a:xfrm>
+          <a:prstGeom prst="rect">
+            <a:avLst/>
+          </a:prstGeom>
+          <a:ln>
+            <a:noFill/>
+          </a:ln>
+        </p:spPr>
+        <p:style>
+          <a:lnRef idx="2">
+            <a:schemeClr val="accent1">
+              <a:shade val="15000"/>
+            </a:schemeClr>
+          </a:lnRef>
+          <a:fillRef idx="1">
+            <a:schemeClr val="accent1"/>
+          </a:fillRef>
+          <a:effectRef idx="0">
+            <a:schemeClr val="accent1"/>
+          </a:effectRef>
+          <a:fontRef idx="minor">
+            <a:schemeClr val="lt1"/>
+          </a:fontRef>
+        </p:style>
+        <p:txBody>
+          <a:bodyPr rtlCol="0" anchor="ctr"/>
+          <a:lstStyle/>
+          <a:p>
+            <a:pPr algn="ctr"/>
+            <a:endParaRPr lang="ko-KR" altLang="en-US"/>
+          </a:p>
+        </p:txBody>
+      </p:sp>
+      <p:sp>
+        <p:nvSpPr>
+          <p:cNvPr id="35" name="직사각형 34">
+            <a:extLst>
+              <a:ext uri="{FF2B5EF4-FFF2-40B4-BE49-F238E27FC236}">
+                <a16:creationId xmlns:a16="http://schemas.microsoft.com/office/drawing/2014/main" id="{601A046C-9130-C36A-BF5E-03FC4445A0C2}"/>
+              </a:ext>
+            </a:extLst>
+          </p:cNvPr>
+          <p:cNvSpPr/>
+          <p:nvPr/>
+        </p:nvSpPr>
+        <p:spPr>
+          <a:xfrm rot="5400000" flipV="1">
+            <a:off x="4607275" y="3364094"/>
+            <a:ext cx="804862" cy="181760"/>
+          </a:xfrm>
+          <a:prstGeom prst="rect">
+            <a:avLst/>
+          </a:prstGeom>
+          <a:ln>
+            <a:noFill/>
+          </a:ln>
+        </p:spPr>
+        <p:style>
+          <a:lnRef idx="2">
+            <a:schemeClr val="accent1">
+              <a:shade val="15000"/>
+            </a:schemeClr>
+          </a:lnRef>
+          <a:fillRef idx="1">
+            <a:schemeClr val="accent1"/>
+          </a:fillRef>
+          <a:effectRef idx="0">
+            <a:schemeClr val="accent1"/>
+          </a:effectRef>
+          <a:fontRef idx="minor">
+            <a:schemeClr val="lt1"/>
+          </a:fontRef>
+        </p:style>
+        <p:txBody>
+          <a:bodyPr rtlCol="0" anchor="ctr"/>
+          <a:lstStyle/>
+          <a:p>
+            <a:pPr algn="ctr"/>
+            <a:endParaRPr lang="ko-KR" altLang="en-US"/>
+          </a:p>
+        </p:txBody>
+      </p:sp>
+      <p:sp>
+        <p:nvSpPr>
+          <p:cNvPr id="37" name="직사각형 36">
+            <a:extLst>
+              <a:ext uri="{FF2B5EF4-FFF2-40B4-BE49-F238E27FC236}">
+                <a16:creationId xmlns:a16="http://schemas.microsoft.com/office/drawing/2014/main" id="{EED4629B-F01D-5893-1CD1-FCC66AB73100}"/>
+              </a:ext>
+            </a:extLst>
+          </p:cNvPr>
+          <p:cNvSpPr/>
+          <p:nvPr/>
+        </p:nvSpPr>
+        <p:spPr>
+          <a:xfrm>
+            <a:off x="2460565" y="1697905"/>
+            <a:ext cx="1326741" cy="152396"/>
+          </a:xfrm>
+          <a:prstGeom prst="rect">
+            <a:avLst/>
+          </a:prstGeom>
+          <a:ln>
+            <a:noFill/>
+          </a:ln>
+        </p:spPr>
+        <p:style>
+          <a:lnRef idx="2">
+            <a:schemeClr val="accent1">
+              <a:shade val="15000"/>
+            </a:schemeClr>
+          </a:lnRef>
+          <a:fillRef idx="1">
+            <a:schemeClr val="accent1"/>
+          </a:fillRef>
+          <a:effectRef idx="0">
+            <a:schemeClr val="accent1"/>
+          </a:effectRef>
+          <a:fontRef idx="minor">
+            <a:schemeClr val="lt1"/>
+          </a:fontRef>
+        </p:style>
+        <p:txBody>
+          <a:bodyPr rtlCol="0" anchor="ctr"/>
+          <a:lstStyle/>
+          <a:p>
+            <a:pPr algn="ctr"/>
+            <a:endParaRPr lang="ko-KR" altLang="en-US"/>
+          </a:p>
+        </p:txBody>
+      </p:sp>
+      <p:sp>
+        <p:nvSpPr>
+          <p:cNvPr id="46" name="직사각형 45">
+            <a:extLst>
+              <a:ext uri="{FF2B5EF4-FFF2-40B4-BE49-F238E27FC236}">
+                <a16:creationId xmlns:a16="http://schemas.microsoft.com/office/drawing/2014/main" id="{BA6888F4-B21F-790F-8762-7FC12A072F7A}"/>
+              </a:ext>
+            </a:extLst>
+          </p:cNvPr>
+          <p:cNvSpPr/>
+          <p:nvPr/>
+        </p:nvSpPr>
+        <p:spPr>
+          <a:xfrm flipV="1">
+            <a:off x="2360710" y="4411680"/>
+            <a:ext cx="1611955" cy="168654"/>
+          </a:xfrm>
+          <a:prstGeom prst="rect">
+            <a:avLst/>
+          </a:prstGeom>
+          <a:ln>
+            <a:noFill/>
+          </a:ln>
+        </p:spPr>
+        <p:style>
+          <a:lnRef idx="2">
+            <a:schemeClr val="accent1">
+              <a:shade val="15000"/>
+            </a:schemeClr>
+          </a:lnRef>
+          <a:fillRef idx="1">
+            <a:schemeClr val="accent1"/>
+          </a:fillRef>
+          <a:effectRef idx="0">
+            <a:schemeClr val="accent1"/>
+          </a:effectRef>
+          <a:fontRef idx="minor">
+            <a:schemeClr val="lt1"/>
+          </a:fontRef>
+        </p:style>
+        <p:txBody>
+          <a:bodyPr rtlCol="0" anchor="ctr"/>
+          <a:lstStyle/>
+          <a:p>
+            <a:pPr algn="ctr"/>
+            <a:endParaRPr lang="ko-KR" altLang="en-US"/>
+          </a:p>
+        </p:txBody>
+      </p:sp>
+      <p:sp>
+        <p:nvSpPr>
+          <p:cNvPr id="28" name="직사각형 27">
+            <a:extLst>
+              <a:ext uri="{FF2B5EF4-FFF2-40B4-BE49-F238E27FC236}">
+                <a16:creationId xmlns:a16="http://schemas.microsoft.com/office/drawing/2014/main" id="{A92E9680-7757-62CA-843E-44607B37C646}"/>
+              </a:ext>
+            </a:extLst>
+          </p:cNvPr>
+          <p:cNvSpPr/>
+          <p:nvPr/>
+        </p:nvSpPr>
+        <p:spPr>
+          <a:xfrm rot="5400000" flipV="1">
+            <a:off x="783225" y="3348196"/>
+            <a:ext cx="3214631" cy="161922"/>
+          </a:xfrm>
+          <a:prstGeom prst="rect">
+            <a:avLst/>
+          </a:prstGeom>
+          <a:ln>
+            <a:noFill/>
+          </a:ln>
+        </p:spPr>
+        <p:style>
+          <a:lnRef idx="2">
+            <a:schemeClr val="accent1">
+              <a:shade val="15000"/>
+            </a:schemeClr>
+          </a:lnRef>
+          <a:fillRef idx="1">
+            <a:schemeClr val="accent1"/>
+          </a:fillRef>
+          <a:effectRef idx="0">
+            <a:schemeClr val="accent1"/>
+          </a:effectRef>
+          <a:fontRef idx="minor">
+            <a:schemeClr val="lt1"/>
+          </a:fontRef>
+        </p:style>
+        <p:txBody>
+          <a:bodyPr rtlCol="0" anchor="ctr"/>
+          <a:lstStyle/>
+          <a:p>
+            <a:pPr algn="ctr"/>
+            <a:endParaRPr lang="ko-KR" altLang="en-US"/>
+          </a:p>
+        </p:txBody>
+      </p:sp>
+      <p:sp>
+        <p:nvSpPr>
+          <p:cNvPr id="50" name="직사각형 49">
+            <a:extLst>
+              <a:ext uri="{FF2B5EF4-FFF2-40B4-BE49-F238E27FC236}">
+                <a16:creationId xmlns:a16="http://schemas.microsoft.com/office/drawing/2014/main" id="{E68F7F6A-CDAA-ACF8-292D-F0CC2ED09018}"/>
+              </a:ext>
+            </a:extLst>
+          </p:cNvPr>
+          <p:cNvSpPr/>
+          <p:nvPr/>
+        </p:nvSpPr>
+        <p:spPr>
+          <a:xfrm rot="5400000">
+            <a:off x="8502296" y="5096231"/>
+            <a:ext cx="1125549" cy="172333"/>
+          </a:xfrm>
+          <a:prstGeom prst="rect">
+            <a:avLst/>
+          </a:prstGeom>
+        </p:spPr>
+        <p:style>
+          <a:lnRef idx="2">
+            <a:schemeClr val="accent1">
+              <a:shade val="15000"/>
+            </a:schemeClr>
+          </a:lnRef>
+          <a:fillRef idx="1">
+            <a:schemeClr val="accent1"/>
+          </a:fillRef>
+          <a:effectRef idx="0">
+            <a:schemeClr val="accent1"/>
+          </a:effectRef>
+          <a:fontRef idx="minor">
+            <a:schemeClr val="lt1"/>
+          </a:fontRef>
+        </p:style>
+        <p:txBody>
+          <a:bodyPr rtlCol="0" anchor="ctr"/>
+          <a:lstStyle/>
+          <a:p>
+            <a:pPr algn="ctr"/>
+            <a:endParaRPr lang="ko-KR" altLang="en-US"/>
+          </a:p>
+        </p:txBody>
+      </p:sp>
+      <p:sp>
+        <p:nvSpPr>
+          <p:cNvPr id="51" name="직사각형 50">
+            <a:extLst>
+              <a:ext uri="{FF2B5EF4-FFF2-40B4-BE49-F238E27FC236}">
+                <a16:creationId xmlns:a16="http://schemas.microsoft.com/office/drawing/2014/main" id="{3B1F2ACC-EA18-470C-57BC-103ED12639CD}"/>
+              </a:ext>
+            </a:extLst>
+          </p:cNvPr>
+          <p:cNvSpPr/>
+          <p:nvPr/>
+        </p:nvSpPr>
+        <p:spPr>
+          <a:xfrm rot="5400000">
+            <a:off x="8505334" y="2911680"/>
+            <a:ext cx="1125543" cy="172332"/>
+          </a:xfrm>
+          <a:prstGeom prst="rect">
+            <a:avLst/>
+          </a:prstGeom>
+        </p:spPr>
+        <p:style>
+          <a:lnRef idx="2">
+            <a:schemeClr val="accent1">
+              <a:shade val="15000"/>
+            </a:schemeClr>
+          </a:lnRef>
+          <a:fillRef idx="1">
+            <a:schemeClr val="accent1"/>
+          </a:fillRef>
+          <a:effectRef idx="0">
+            <a:schemeClr val="accent1"/>
+          </a:effectRef>
+          <a:fontRef idx="minor">
+            <a:schemeClr val="lt1"/>
+          </a:fontRef>
+        </p:style>
+        <p:txBody>
+          <a:bodyPr rtlCol="0" anchor="ctr"/>
+          <a:lstStyle/>
+          <a:p>
+            <a:pPr algn="ctr"/>
+            <a:endParaRPr lang="ko-KR" altLang="en-US"/>
+          </a:p>
+        </p:txBody>
+      </p:sp>
+      <p:sp>
+        <p:nvSpPr>
+          <p:cNvPr id="43" name="직사각형 42">
+            <a:extLst>
+              <a:ext uri="{FF2B5EF4-FFF2-40B4-BE49-F238E27FC236}">
+                <a16:creationId xmlns:a16="http://schemas.microsoft.com/office/drawing/2014/main" id="{B9215AC2-7E9A-AE02-45A6-E22E6BCE287F}"/>
+              </a:ext>
+            </a:extLst>
+          </p:cNvPr>
+          <p:cNvSpPr/>
+          <p:nvPr/>
+        </p:nvSpPr>
+        <p:spPr>
+          <a:xfrm>
+            <a:off x="1326397" y="3397048"/>
+            <a:ext cx="3750340" cy="195783"/>
+          </a:xfrm>
+          <a:prstGeom prst="rect">
+            <a:avLst/>
+          </a:prstGeom>
+          <a:ln>
+            <a:noFill/>
+          </a:ln>
+        </p:spPr>
+        <p:style>
+          <a:lnRef idx="2">
+            <a:schemeClr val="accent1">
+              <a:shade val="15000"/>
+            </a:schemeClr>
+          </a:lnRef>
+          <a:fillRef idx="1">
+            <a:schemeClr val="accent1"/>
+          </a:fillRef>
+          <a:effectRef idx="0">
+            <a:schemeClr val="accent1"/>
+          </a:effectRef>
+          <a:fontRef idx="minor">
+            <a:schemeClr val="lt1"/>
+          </a:fontRef>
+        </p:style>
+        <p:txBody>
+          <a:bodyPr rtlCol="0" anchor="ctr"/>
+          <a:lstStyle/>
+          <a:p>
+            <a:pPr algn="ctr"/>
+            <a:endParaRPr lang="ko-KR" altLang="en-US"/>
+          </a:p>
+        </p:txBody>
+      </p:sp>
+      <p:sp>
+        <p:nvSpPr>
+          <p:cNvPr id="32" name="직사각형 31">
+            <a:extLst>
+              <a:ext uri="{FF2B5EF4-FFF2-40B4-BE49-F238E27FC236}">
+                <a16:creationId xmlns:a16="http://schemas.microsoft.com/office/drawing/2014/main" id="{1A2FDEDF-79DE-F1AF-0F38-83EEB41C352B}"/>
+              </a:ext>
+            </a:extLst>
+          </p:cNvPr>
+          <p:cNvSpPr/>
+          <p:nvPr/>
+        </p:nvSpPr>
+        <p:spPr>
+          <a:xfrm rot="5400000" flipV="1">
+            <a:off x="2988403" y="836594"/>
+            <a:ext cx="140717" cy="3883606"/>
+          </a:xfrm>
+          <a:prstGeom prst="rect">
+            <a:avLst/>
+          </a:prstGeom>
+          <a:ln>
+            <a:noFill/>
+          </a:ln>
+        </p:spPr>
+        <p:style>
+          <a:lnRef idx="2">
+            <a:schemeClr val="accent1">
+              <a:shade val="15000"/>
+            </a:schemeClr>
+          </a:lnRef>
+          <a:fillRef idx="1">
+            <a:schemeClr val="accent1"/>
+          </a:fillRef>
+          <a:effectRef idx="0">
+            <a:schemeClr val="accent1"/>
+          </a:effectRef>
+          <a:fontRef idx="minor">
+            <a:schemeClr val="lt1"/>
+          </a:fontRef>
+        </p:style>
+        <p:txBody>
+          <a:bodyPr rtlCol="0" anchor="ctr"/>
+          <a:lstStyle/>
+          <a:p>
+            <a:pPr algn="ctr"/>
+            <a:endParaRPr lang="ko-KR" altLang="en-US"/>
+          </a:p>
+        </p:txBody>
+      </p:sp>
+      <p:sp>
+        <p:nvSpPr>
+          <p:cNvPr id="6" name="직사각형 5">
+            <a:extLst>
+              <a:ext uri="{FF2B5EF4-FFF2-40B4-BE49-F238E27FC236}">
+                <a16:creationId xmlns:a16="http://schemas.microsoft.com/office/drawing/2014/main" id="{7874FDB8-5305-3D46-58CE-76E03C33E75F}"/>
+              </a:ext>
+            </a:extLst>
+          </p:cNvPr>
+          <p:cNvSpPr/>
+          <p:nvPr/>
+        </p:nvSpPr>
+        <p:spPr>
+          <a:xfrm>
+            <a:off x="1103798" y="2528668"/>
             <a:ext cx="542924" cy="523875"/>
           </a:xfrm>
           <a:prstGeom prst="rect">
@@ -3815,10 +4347,10 @@
       </p:sp>
       <p:sp>
         <p:nvSpPr>
-          <p:cNvPr id="5" name="직사각형 4">
-            <a:extLst>
-              <a:ext uri="{FF2B5EF4-FFF2-40B4-BE49-F238E27FC236}">
-                <a16:creationId xmlns:a16="http://schemas.microsoft.com/office/drawing/2014/main" id="{25117B80-36BF-23F7-3CFC-3815548E79E0}"/>
+          <p:cNvPr id="7" name="직사각형 6">
+            <a:extLst>
+              <a:ext uri="{FF2B5EF4-FFF2-40B4-BE49-F238E27FC236}">
+                <a16:creationId xmlns:a16="http://schemas.microsoft.com/office/drawing/2014/main" id="{14D1F5C4-4CFA-D693-8741-6E36500D50FB}"/>
               </a:ext>
             </a:extLst>
           </p:cNvPr>
@@ -3827,7 +4359,7 @@
         </p:nvSpPr>
         <p:spPr>
           <a:xfrm>
-            <a:off x="1070498" y="3943348"/>
+            <a:off x="2128829" y="1501878"/>
             <a:ext cx="542924" cy="523875"/>
           </a:xfrm>
           <a:prstGeom prst="rect">
@@ -3855,16 +4387,16 @@
           <a:lstStyle/>
           <a:p>
             <a:pPr algn="ctr"/>
-            <a:endParaRPr lang="ko-KR" altLang="en-US" dirty="0"/>
-          </a:p>
-        </p:txBody>
-      </p:sp>
-      <p:sp>
-        <p:nvSpPr>
-          <p:cNvPr id="6" name="직사각형 5">
-            <a:extLst>
-              <a:ext uri="{FF2B5EF4-FFF2-40B4-BE49-F238E27FC236}">
-                <a16:creationId xmlns:a16="http://schemas.microsoft.com/office/drawing/2014/main" id="{7874FDB8-5305-3D46-58CE-76E03C33E75F}"/>
+            <a:endParaRPr lang="ko-KR" altLang="en-US"/>
+          </a:p>
+        </p:txBody>
+      </p:sp>
+      <p:sp>
+        <p:nvSpPr>
+          <p:cNvPr id="8" name="직사각형 7">
+            <a:extLst>
+              <a:ext uri="{FF2B5EF4-FFF2-40B4-BE49-F238E27FC236}">
+                <a16:creationId xmlns:a16="http://schemas.microsoft.com/office/drawing/2014/main" id="{6480C4E2-2965-086E-5BF0-4E71CB8A8468}"/>
               </a:ext>
             </a:extLst>
           </p:cNvPr>
@@ -3873,7 +4405,7 @@
         </p:nvSpPr>
         <p:spPr>
           <a:xfrm>
-            <a:off x="1055500" y="2594606"/>
+            <a:off x="3689397" y="1486642"/>
             <a:ext cx="542924" cy="523875"/>
           </a:xfrm>
           <a:prstGeom prst="rect">
@@ -3901,16 +4433,16 @@
           <a:lstStyle/>
           <a:p>
             <a:pPr algn="ctr"/>
-            <a:endParaRPr lang="ko-KR" altLang="en-US" dirty="0"/>
-          </a:p>
-        </p:txBody>
-      </p:sp>
-      <p:sp>
-        <p:nvSpPr>
-          <p:cNvPr id="7" name="직사각형 6">
-            <a:extLst>
-              <a:ext uri="{FF2B5EF4-FFF2-40B4-BE49-F238E27FC236}">
-                <a16:creationId xmlns:a16="http://schemas.microsoft.com/office/drawing/2014/main" id="{14D1F5C4-4CFA-D693-8741-6E36500D50FB}"/>
+            <a:endParaRPr lang="ko-KR" altLang="en-US"/>
+          </a:p>
+        </p:txBody>
+      </p:sp>
+      <p:sp>
+        <p:nvSpPr>
+          <p:cNvPr id="9" name="직사각형 8">
+            <a:extLst>
+              <a:ext uri="{FF2B5EF4-FFF2-40B4-BE49-F238E27FC236}">
+                <a16:creationId xmlns:a16="http://schemas.microsoft.com/office/drawing/2014/main" id="{7BD3ED12-60D1-8BDD-C34E-BCC3FDC9A44F}"/>
               </a:ext>
             </a:extLst>
           </p:cNvPr>
@@ -3919,7 +4451,7 @@
         </p:nvSpPr>
         <p:spPr>
           <a:xfrm>
-            <a:off x="2022633" y="1567816"/>
+            <a:off x="4729103" y="2548673"/>
             <a:ext cx="542924" cy="523875"/>
           </a:xfrm>
           <a:prstGeom prst="rect">
@@ -3953,10 +4485,10 @@
       </p:sp>
       <p:sp>
         <p:nvSpPr>
-          <p:cNvPr id="8" name="직사각형 7">
-            <a:extLst>
-              <a:ext uri="{FF2B5EF4-FFF2-40B4-BE49-F238E27FC236}">
-                <a16:creationId xmlns:a16="http://schemas.microsoft.com/office/drawing/2014/main" id="{6480C4E2-2965-086E-5BF0-4E71CB8A8468}"/>
+          <p:cNvPr id="13" name="직사각형 12">
+            <a:extLst>
+              <a:ext uri="{FF2B5EF4-FFF2-40B4-BE49-F238E27FC236}">
+                <a16:creationId xmlns:a16="http://schemas.microsoft.com/office/drawing/2014/main" id="{6A772CA9-8508-E08F-76A8-A81601ADA35A}"/>
               </a:ext>
             </a:extLst>
           </p:cNvPr>
@@ -3965,8 +4497,108 @@
         </p:nvSpPr>
         <p:spPr>
           <a:xfrm>
-            <a:off x="3689397" y="1552580"/>
-            <a:ext cx="542924" cy="523875"/>
+            <a:off x="6362702" y="590550"/>
+            <a:ext cx="1414461" cy="647700"/>
+          </a:xfrm>
+          <a:prstGeom prst="rect">
+            <a:avLst/>
+          </a:prstGeom>
+        </p:spPr>
+        <p:style>
+          <a:lnRef idx="2">
+            <a:schemeClr val="accent1">
+              <a:shade val="15000"/>
+            </a:schemeClr>
+          </a:lnRef>
+          <a:fillRef idx="1">
+            <a:schemeClr val="accent1"/>
+          </a:fillRef>
+          <a:effectRef idx="0">
+            <a:schemeClr val="accent1"/>
+          </a:effectRef>
+          <a:fontRef idx="minor">
+            <a:schemeClr val="lt1"/>
+          </a:fontRef>
+        </p:style>
+        <p:txBody>
+          <a:bodyPr rtlCol="0" anchor="ctr"/>
+          <a:lstStyle/>
+          <a:p>
+            <a:pPr algn="ctr"/>
+            <a:r>
+              <a:rPr lang="en-US" altLang="ko-KR" dirty="0"/>
+              <a:t>2F</a:t>
+            </a:r>
+            <a:endParaRPr lang="ko-KR" altLang="en-US" dirty="0"/>
+          </a:p>
+        </p:txBody>
+      </p:sp>
+      <p:sp>
+        <p:nvSpPr>
+          <p:cNvPr id="14" name="직사각형 13">
+            <a:extLst>
+              <a:ext uri="{FF2B5EF4-FFF2-40B4-BE49-F238E27FC236}">
+                <a16:creationId xmlns:a16="http://schemas.microsoft.com/office/drawing/2014/main" id="{3E36FA53-EE38-ACCF-860D-AB7E66D5A85E}"/>
+              </a:ext>
+            </a:extLst>
+          </p:cNvPr>
+          <p:cNvSpPr/>
+          <p:nvPr/>
+        </p:nvSpPr>
+        <p:spPr>
+          <a:xfrm>
+            <a:off x="647700" y="590550"/>
+            <a:ext cx="1028700" cy="704850"/>
+          </a:xfrm>
+          <a:prstGeom prst="rect">
+            <a:avLst/>
+          </a:prstGeom>
+        </p:spPr>
+        <p:style>
+          <a:lnRef idx="2">
+            <a:schemeClr val="accent1">
+              <a:shade val="15000"/>
+            </a:schemeClr>
+          </a:lnRef>
+          <a:fillRef idx="1">
+            <a:schemeClr val="accent1"/>
+          </a:fillRef>
+          <a:effectRef idx="0">
+            <a:schemeClr val="accent1"/>
+          </a:effectRef>
+          <a:fontRef idx="minor">
+            <a:schemeClr val="lt1"/>
+          </a:fontRef>
+        </p:style>
+        <p:txBody>
+          <a:bodyPr rtlCol="0" anchor="ctr"/>
+          <a:lstStyle/>
+          <a:p>
+            <a:pPr algn="ctr"/>
+            <a:r>
+              <a:rPr lang="en-US" altLang="ko-KR" dirty="0"/>
+              <a:t>1F</a:t>
+            </a:r>
+            <a:endParaRPr lang="ko-KR" altLang="en-US" dirty="0"/>
+          </a:p>
+        </p:txBody>
+      </p:sp>
+      <p:sp>
+        <p:nvSpPr>
+          <p:cNvPr id="15" name="직사각형 14">
+            <a:extLst>
+              <a:ext uri="{FF2B5EF4-FFF2-40B4-BE49-F238E27FC236}">
+                <a16:creationId xmlns:a16="http://schemas.microsoft.com/office/drawing/2014/main" id="{5FB8828F-57FF-646D-D3F3-CFC10ADC3886}"/>
+              </a:ext>
+            </a:extLst>
+          </p:cNvPr>
+          <p:cNvSpPr/>
+          <p:nvPr/>
+        </p:nvSpPr>
+        <p:spPr>
+          <a:xfrm>
+            <a:off x="8068736" y="2733675"/>
+            <a:ext cx="2105028" cy="1885948"/>
           </a:xfrm>
           <a:prstGeom prst="rect">
             <a:avLst/>
@@ -3999,10 +4631,10 @@
       </p:sp>
       <p:sp>
         <p:nvSpPr>
-          <p:cNvPr id="9" name="직사각형 8">
-            <a:extLst>
-              <a:ext uri="{FF2B5EF4-FFF2-40B4-BE49-F238E27FC236}">
-                <a16:creationId xmlns:a16="http://schemas.microsoft.com/office/drawing/2014/main" id="{7BD3ED12-60D1-8BDD-C34E-BCC3FDC9A44F}"/>
+          <p:cNvPr id="16" name="직사각형 15">
+            <a:extLst>
+              <a:ext uri="{FF2B5EF4-FFF2-40B4-BE49-F238E27FC236}">
+                <a16:creationId xmlns:a16="http://schemas.microsoft.com/office/drawing/2014/main" id="{963CDD0B-3ED3-C30D-2ADE-8A391D6F13F5}"/>
               </a:ext>
             </a:extLst>
           </p:cNvPr>
@@ -4011,8 +4643,8 @@
         </p:nvSpPr>
         <p:spPr>
           <a:xfrm>
-            <a:off x="4595813" y="2614611"/>
-            <a:ext cx="542924" cy="523875"/>
+            <a:off x="8678392" y="1577824"/>
+            <a:ext cx="857249" cy="857250"/>
           </a:xfrm>
           <a:prstGeom prst="rect">
             <a:avLst/>
@@ -4045,10 +4677,10 @@
       </p:sp>
       <p:sp>
         <p:nvSpPr>
-          <p:cNvPr id="10" name="직사각형 9">
-            <a:extLst>
-              <a:ext uri="{FF2B5EF4-FFF2-40B4-BE49-F238E27FC236}">
-                <a16:creationId xmlns:a16="http://schemas.microsoft.com/office/drawing/2014/main" id="{E78BF425-65A0-38D3-789B-45789FCDE678}"/>
+          <p:cNvPr id="17" name="직사각형 16">
+            <a:extLst>
+              <a:ext uri="{FF2B5EF4-FFF2-40B4-BE49-F238E27FC236}">
+                <a16:creationId xmlns:a16="http://schemas.microsoft.com/office/drawing/2014/main" id="{C5A1170D-31BE-63F2-02DB-E9B017E3540C}"/>
               </a:ext>
             </a:extLst>
           </p:cNvPr>
@@ -4057,8 +4689,8 @@
         </p:nvSpPr>
         <p:spPr>
           <a:xfrm>
-            <a:off x="4595813" y="3943348"/>
-            <a:ext cx="542924" cy="523875"/>
+            <a:off x="10521426" y="3248025"/>
+            <a:ext cx="857249" cy="857250"/>
           </a:xfrm>
           <a:prstGeom prst="rect">
             <a:avLst/>
@@ -4091,10 +4723,10 @@
       </p:sp>
       <p:sp>
         <p:nvSpPr>
-          <p:cNvPr id="11" name="직사각형 10">
-            <a:extLst>
-              <a:ext uri="{FF2B5EF4-FFF2-40B4-BE49-F238E27FC236}">
-                <a16:creationId xmlns:a16="http://schemas.microsoft.com/office/drawing/2014/main" id="{CC06ADE7-B03B-CA59-E568-ABCF26775240}"/>
+          <p:cNvPr id="18" name="직사각형 17">
+            <a:extLst>
+              <a:ext uri="{FF2B5EF4-FFF2-40B4-BE49-F238E27FC236}">
+                <a16:creationId xmlns:a16="http://schemas.microsoft.com/office/drawing/2014/main" id="{AB29C06F-E499-8CFD-4687-D1A9012F1E26}"/>
               </a:ext>
             </a:extLst>
           </p:cNvPr>
@@ -4103,8 +4735,8 @@
         </p:nvSpPr>
         <p:spPr>
           <a:xfrm>
-            <a:off x="3677844" y="4918224"/>
-            <a:ext cx="542924" cy="523875"/>
+            <a:off x="8669765" y="4918224"/>
+            <a:ext cx="857249" cy="857250"/>
           </a:xfrm>
           <a:prstGeom prst="rect">
             <a:avLst/>
@@ -4137,10 +4769,10 @@
       </p:sp>
       <p:sp>
         <p:nvSpPr>
-          <p:cNvPr id="13" name="직사각형 12">
-            <a:extLst>
-              <a:ext uri="{FF2B5EF4-FFF2-40B4-BE49-F238E27FC236}">
-                <a16:creationId xmlns:a16="http://schemas.microsoft.com/office/drawing/2014/main" id="{6A772CA9-8508-E08F-76A8-A81601ADA35A}"/>
+          <p:cNvPr id="19" name="직사각형 18">
+            <a:extLst>
+              <a:ext uri="{FF2B5EF4-FFF2-40B4-BE49-F238E27FC236}">
+                <a16:creationId xmlns:a16="http://schemas.microsoft.com/office/drawing/2014/main" id="{48D12741-3D4F-2D2D-C33E-66B28B84B446}"/>
               </a:ext>
             </a:extLst>
           </p:cNvPr>
@@ -4149,108 +4781,8 @@
         </p:nvSpPr>
         <p:spPr>
           <a:xfrm>
-            <a:off x="6362702" y="590550"/>
-            <a:ext cx="1414461" cy="647700"/>
-          </a:xfrm>
-          <a:prstGeom prst="rect">
-            <a:avLst/>
-          </a:prstGeom>
-        </p:spPr>
-        <p:style>
-          <a:lnRef idx="2">
-            <a:schemeClr val="accent1">
-              <a:shade val="15000"/>
-            </a:schemeClr>
-          </a:lnRef>
-          <a:fillRef idx="1">
-            <a:schemeClr val="accent1"/>
-          </a:fillRef>
-          <a:effectRef idx="0">
-            <a:schemeClr val="accent1"/>
-          </a:effectRef>
-          <a:fontRef idx="minor">
-            <a:schemeClr val="lt1"/>
-          </a:fontRef>
-        </p:style>
-        <p:txBody>
-          <a:bodyPr rtlCol="0" anchor="ctr"/>
-          <a:lstStyle/>
-          <a:p>
-            <a:pPr algn="ctr"/>
-            <a:r>
-              <a:rPr lang="en-US" altLang="ko-KR" dirty="0"/>
-              <a:t>2F</a:t>
-            </a:r>
-            <a:endParaRPr lang="ko-KR" altLang="en-US" dirty="0"/>
-          </a:p>
-        </p:txBody>
-      </p:sp>
-      <p:sp>
-        <p:nvSpPr>
-          <p:cNvPr id="14" name="직사각형 13">
-            <a:extLst>
-              <a:ext uri="{FF2B5EF4-FFF2-40B4-BE49-F238E27FC236}">
-                <a16:creationId xmlns:a16="http://schemas.microsoft.com/office/drawing/2014/main" id="{3E36FA53-EE38-ACCF-860D-AB7E66D5A85E}"/>
-              </a:ext>
-            </a:extLst>
-          </p:cNvPr>
-          <p:cNvSpPr/>
-          <p:nvPr/>
-        </p:nvSpPr>
-        <p:spPr>
-          <a:xfrm>
-            <a:off x="647700" y="590550"/>
-            <a:ext cx="1028700" cy="704850"/>
-          </a:xfrm>
-          <a:prstGeom prst="rect">
-            <a:avLst/>
-          </a:prstGeom>
-        </p:spPr>
-        <p:style>
-          <a:lnRef idx="2">
-            <a:schemeClr val="accent1">
-              <a:shade val="15000"/>
-            </a:schemeClr>
-          </a:lnRef>
-          <a:fillRef idx="1">
-            <a:schemeClr val="accent1"/>
-          </a:fillRef>
-          <a:effectRef idx="0">
-            <a:schemeClr val="accent1"/>
-          </a:effectRef>
-          <a:fontRef idx="minor">
-            <a:schemeClr val="lt1"/>
-          </a:fontRef>
-        </p:style>
-        <p:txBody>
-          <a:bodyPr rtlCol="0" anchor="ctr"/>
-          <a:lstStyle/>
-          <a:p>
-            <a:pPr algn="ctr"/>
-            <a:r>
-              <a:rPr lang="en-US" altLang="ko-KR" dirty="0"/>
-              <a:t>1F</a:t>
-            </a:r>
-            <a:endParaRPr lang="ko-KR" altLang="en-US" dirty="0"/>
-          </a:p>
-        </p:txBody>
-      </p:sp>
-      <p:sp>
-        <p:nvSpPr>
-          <p:cNvPr id="15" name="직사각형 14">
-            <a:extLst>
-              <a:ext uri="{FF2B5EF4-FFF2-40B4-BE49-F238E27FC236}">
-                <a16:creationId xmlns:a16="http://schemas.microsoft.com/office/drawing/2014/main" id="{5FB8828F-57FF-646D-D3F3-CFC10ADC3886}"/>
-              </a:ext>
-            </a:extLst>
-          </p:cNvPr>
-          <p:cNvSpPr/>
-          <p:nvPr/>
-        </p:nvSpPr>
-        <p:spPr>
-          <a:xfrm>
-            <a:off x="8068736" y="2733675"/>
-            <a:ext cx="2105028" cy="1885948"/>
+            <a:off x="6863825" y="3248025"/>
+            <a:ext cx="857249" cy="857250"/>
           </a:xfrm>
           <a:prstGeom prst="rect">
             <a:avLst/>
@@ -4283,10 +4815,10 @@
       </p:sp>
       <p:sp>
         <p:nvSpPr>
-          <p:cNvPr id="16" name="직사각형 15">
-            <a:extLst>
-              <a:ext uri="{FF2B5EF4-FFF2-40B4-BE49-F238E27FC236}">
-                <a16:creationId xmlns:a16="http://schemas.microsoft.com/office/drawing/2014/main" id="{963CDD0B-3ED3-C30D-2ADE-8A391D6F13F5}"/>
+          <p:cNvPr id="26" name="직사각형 25">
+            <a:extLst>
+              <a:ext uri="{FF2B5EF4-FFF2-40B4-BE49-F238E27FC236}">
+                <a16:creationId xmlns:a16="http://schemas.microsoft.com/office/drawing/2014/main" id="{18F3C89D-3689-24D8-6191-87B98CEF01C8}"/>
               </a:ext>
             </a:extLst>
           </p:cNvPr>
@@ -4294,9 +4826,714 @@
           <p:nvPr/>
         </p:nvSpPr>
         <p:spPr>
-          <a:xfrm>
-            <a:off x="8639175" y="1577824"/>
-            <a:ext cx="857249" cy="857250"/>
+          <a:xfrm rot="5400000" flipV="1">
+            <a:off x="1269436" y="3653674"/>
+            <a:ext cx="3809764" cy="161921"/>
+          </a:xfrm>
+          <a:prstGeom prst="rect">
+            <a:avLst/>
+          </a:prstGeom>
+          <a:ln>
+            <a:noFill/>
+          </a:ln>
+        </p:spPr>
+        <p:style>
+          <a:lnRef idx="2">
+            <a:schemeClr val="accent1">
+              <a:shade val="15000"/>
+            </a:schemeClr>
+          </a:lnRef>
+          <a:fillRef idx="1">
+            <a:schemeClr val="accent1"/>
+          </a:fillRef>
+          <a:effectRef idx="0">
+            <a:schemeClr val="accent1"/>
+          </a:effectRef>
+          <a:fontRef idx="minor">
+            <a:schemeClr val="lt1"/>
+          </a:fontRef>
+        </p:style>
+        <p:txBody>
+          <a:bodyPr rtlCol="0" anchor="ctr"/>
+          <a:lstStyle/>
+          <a:p>
+            <a:pPr algn="ctr"/>
+            <a:endParaRPr lang="ko-KR" altLang="en-US"/>
+          </a:p>
+        </p:txBody>
+      </p:sp>
+      <p:sp>
+        <p:nvSpPr>
+          <p:cNvPr id="25" name="직사각형 24">
+            <a:extLst>
+              <a:ext uri="{FF2B5EF4-FFF2-40B4-BE49-F238E27FC236}">
+                <a16:creationId xmlns:a16="http://schemas.microsoft.com/office/drawing/2014/main" id="{CE710DE1-CE55-1057-99DD-D93FA2067D63}"/>
+              </a:ext>
+            </a:extLst>
+          </p:cNvPr>
+          <p:cNvSpPr/>
+          <p:nvPr/>
+        </p:nvSpPr>
+        <p:spPr>
+          <a:xfrm>
+            <a:off x="2559841" y="4891758"/>
+            <a:ext cx="1107285" cy="168654"/>
+          </a:xfrm>
+          <a:prstGeom prst="rect">
+            <a:avLst/>
+          </a:prstGeom>
+          <a:ln>
+            <a:noFill/>
+          </a:ln>
+        </p:spPr>
+        <p:style>
+          <a:lnRef idx="2">
+            <a:schemeClr val="accent1">
+              <a:shade val="15000"/>
+            </a:schemeClr>
+          </a:lnRef>
+          <a:fillRef idx="1">
+            <a:schemeClr val="accent1"/>
+          </a:fillRef>
+          <a:effectRef idx="0">
+            <a:schemeClr val="accent1"/>
+          </a:effectRef>
+          <a:fontRef idx="minor">
+            <a:schemeClr val="lt1"/>
+          </a:fontRef>
+        </p:style>
+        <p:txBody>
+          <a:bodyPr rtlCol="0" anchor="ctr"/>
+          <a:lstStyle/>
+          <a:p>
+            <a:pPr algn="ctr"/>
+            <a:endParaRPr lang="ko-KR" altLang="en-US"/>
+          </a:p>
+        </p:txBody>
+      </p:sp>
+      <p:sp>
+        <p:nvSpPr>
+          <p:cNvPr id="42" name="직사각형 41">
+            <a:extLst>
+              <a:ext uri="{FF2B5EF4-FFF2-40B4-BE49-F238E27FC236}">
+                <a16:creationId xmlns:a16="http://schemas.microsoft.com/office/drawing/2014/main" id="{A4057DD6-3549-E8CD-9FD8-818007B20196}"/>
+              </a:ext>
+            </a:extLst>
+          </p:cNvPr>
+          <p:cNvSpPr/>
+          <p:nvPr/>
+        </p:nvSpPr>
+        <p:spPr>
+          <a:xfrm rot="5400000">
+            <a:off x="3870019" y="3349080"/>
+            <a:ext cx="1277317" cy="181757"/>
+          </a:xfrm>
+          <a:prstGeom prst="rect">
+            <a:avLst/>
+          </a:prstGeom>
+          <a:ln>
+            <a:noFill/>
+          </a:ln>
+        </p:spPr>
+        <p:style>
+          <a:lnRef idx="2">
+            <a:schemeClr val="accent1">
+              <a:shade val="15000"/>
+            </a:schemeClr>
+          </a:lnRef>
+          <a:fillRef idx="1">
+            <a:schemeClr val="accent1"/>
+          </a:fillRef>
+          <a:effectRef idx="0">
+            <a:schemeClr val="accent1"/>
+          </a:effectRef>
+          <a:fontRef idx="minor">
+            <a:schemeClr val="lt1"/>
+          </a:fontRef>
+        </p:style>
+        <p:txBody>
+          <a:bodyPr rtlCol="0" anchor="ctr"/>
+          <a:lstStyle/>
+          <a:p>
+            <a:pPr algn="ctr"/>
+            <a:endParaRPr lang="ko-KR" altLang="en-US"/>
+          </a:p>
+        </p:txBody>
+      </p:sp>
+      <p:sp>
+        <p:nvSpPr>
+          <p:cNvPr id="44" name="직사각형 43">
+            <a:extLst>
+              <a:ext uri="{FF2B5EF4-FFF2-40B4-BE49-F238E27FC236}">
+                <a16:creationId xmlns:a16="http://schemas.microsoft.com/office/drawing/2014/main" id="{DE5E8BD0-EDD8-3604-37DE-951D0C72EB36}"/>
+              </a:ext>
+            </a:extLst>
+          </p:cNvPr>
+          <p:cNvSpPr/>
+          <p:nvPr/>
+        </p:nvSpPr>
+        <p:spPr>
+          <a:xfrm flipV="1">
+            <a:off x="2341530" y="2233334"/>
+            <a:ext cx="1637477" cy="140717"/>
+          </a:xfrm>
+          <a:prstGeom prst="rect">
+            <a:avLst/>
+          </a:prstGeom>
+          <a:ln>
+            <a:noFill/>
+          </a:ln>
+        </p:spPr>
+        <p:style>
+          <a:lnRef idx="2">
+            <a:schemeClr val="accent1">
+              <a:shade val="15000"/>
+            </a:schemeClr>
+          </a:lnRef>
+          <a:fillRef idx="1">
+            <a:schemeClr val="accent1"/>
+          </a:fillRef>
+          <a:effectRef idx="0">
+            <a:schemeClr val="accent1"/>
+          </a:effectRef>
+          <a:fontRef idx="minor">
+            <a:schemeClr val="lt1"/>
+          </a:fontRef>
+        </p:style>
+        <p:txBody>
+          <a:bodyPr rtlCol="0" anchor="ctr"/>
+          <a:lstStyle/>
+          <a:p>
+            <a:pPr algn="ctr"/>
+            <a:endParaRPr lang="ko-KR" altLang="en-US"/>
+          </a:p>
+        </p:txBody>
+      </p:sp>
+      <p:sp>
+        <p:nvSpPr>
+          <p:cNvPr id="40" name="직사각형 39">
+            <a:extLst>
+              <a:ext uri="{FF2B5EF4-FFF2-40B4-BE49-F238E27FC236}">
+                <a16:creationId xmlns:a16="http://schemas.microsoft.com/office/drawing/2014/main" id="{C53E01BA-99FB-FD12-46F7-A2547A048609}"/>
+              </a:ext>
+            </a:extLst>
+          </p:cNvPr>
+          <p:cNvSpPr/>
+          <p:nvPr/>
+        </p:nvSpPr>
+        <p:spPr>
+          <a:xfrm rot="5400000">
+            <a:off x="1322403" y="3363156"/>
+            <a:ext cx="1226101" cy="131692"/>
+          </a:xfrm>
+          <a:prstGeom prst="rect">
+            <a:avLst/>
+          </a:prstGeom>
+          <a:ln>
+            <a:noFill/>
+          </a:ln>
+        </p:spPr>
+        <p:style>
+          <a:lnRef idx="2">
+            <a:schemeClr val="accent1">
+              <a:shade val="15000"/>
+            </a:schemeClr>
+          </a:lnRef>
+          <a:fillRef idx="1">
+            <a:schemeClr val="accent1"/>
+          </a:fillRef>
+          <a:effectRef idx="0">
+            <a:schemeClr val="accent1"/>
+          </a:effectRef>
+          <a:fontRef idx="minor">
+            <a:schemeClr val="lt1"/>
+          </a:fontRef>
+        </p:style>
+        <p:txBody>
+          <a:bodyPr rtlCol="0" anchor="ctr"/>
+          <a:lstStyle/>
+          <a:p>
+            <a:pPr algn="ctr"/>
+            <a:endParaRPr lang="ko-KR" altLang="en-US"/>
+          </a:p>
+        </p:txBody>
+      </p:sp>
+      <p:sp>
+        <p:nvSpPr>
+          <p:cNvPr id="20" name="직사각형 19">
+            <a:extLst>
+              <a:ext uri="{FF2B5EF4-FFF2-40B4-BE49-F238E27FC236}">
+                <a16:creationId xmlns:a16="http://schemas.microsoft.com/office/drawing/2014/main" id="{BE06B869-0FAF-C57D-98CE-339AFD2145B5}"/>
+              </a:ext>
+            </a:extLst>
+          </p:cNvPr>
+          <p:cNvSpPr/>
+          <p:nvPr/>
+        </p:nvSpPr>
+        <p:spPr>
+          <a:xfrm>
+            <a:off x="1857622" y="3402496"/>
+            <a:ext cx="161924" cy="152396"/>
+          </a:xfrm>
+          <a:prstGeom prst="rect">
+            <a:avLst/>
+          </a:prstGeom>
+        </p:spPr>
+        <p:style>
+          <a:lnRef idx="2">
+            <a:schemeClr val="accent2">
+              <a:shade val="15000"/>
+            </a:schemeClr>
+          </a:lnRef>
+          <a:fillRef idx="1">
+            <a:schemeClr val="accent2"/>
+          </a:fillRef>
+          <a:effectRef idx="0">
+            <a:schemeClr val="accent2"/>
+          </a:effectRef>
+          <a:fontRef idx="minor">
+            <a:schemeClr val="lt1"/>
+          </a:fontRef>
+        </p:style>
+        <p:txBody>
+          <a:bodyPr rtlCol="0" anchor="ctr"/>
+          <a:lstStyle/>
+          <a:p>
+            <a:pPr algn="ctr"/>
+            <a:endParaRPr lang="ko-KR" altLang="en-US" dirty="0"/>
+          </a:p>
+        </p:txBody>
+      </p:sp>
+      <p:sp>
+        <p:nvSpPr>
+          <p:cNvPr id="21" name="직사각형 20">
+            <a:extLst>
+              <a:ext uri="{FF2B5EF4-FFF2-40B4-BE49-F238E27FC236}">
+                <a16:creationId xmlns:a16="http://schemas.microsoft.com/office/drawing/2014/main" id="{307495CC-50AD-751E-AD44-12E37B41D378}"/>
+              </a:ext>
+            </a:extLst>
+          </p:cNvPr>
+          <p:cNvSpPr/>
+          <p:nvPr/>
+        </p:nvSpPr>
+        <p:spPr>
+          <a:xfrm>
+            <a:off x="3085841" y="2200532"/>
+            <a:ext cx="161924" cy="152396"/>
+          </a:xfrm>
+          <a:prstGeom prst="rect">
+            <a:avLst/>
+          </a:prstGeom>
+        </p:spPr>
+        <p:style>
+          <a:lnRef idx="2">
+            <a:schemeClr val="accent2">
+              <a:shade val="15000"/>
+            </a:schemeClr>
+          </a:lnRef>
+          <a:fillRef idx="1">
+            <a:schemeClr val="accent2"/>
+          </a:fillRef>
+          <a:effectRef idx="0">
+            <a:schemeClr val="accent2"/>
+          </a:effectRef>
+          <a:fontRef idx="minor">
+            <a:schemeClr val="lt1"/>
+          </a:fontRef>
+        </p:style>
+        <p:txBody>
+          <a:bodyPr rtlCol="0" anchor="ctr"/>
+          <a:lstStyle/>
+          <a:p>
+            <a:pPr algn="ctr"/>
+            <a:endParaRPr lang="ko-KR" altLang="en-US"/>
+          </a:p>
+        </p:txBody>
+      </p:sp>
+      <p:sp>
+        <p:nvSpPr>
+          <p:cNvPr id="22" name="직사각형 21">
+            <a:extLst>
+              <a:ext uri="{FF2B5EF4-FFF2-40B4-BE49-F238E27FC236}">
+                <a16:creationId xmlns:a16="http://schemas.microsoft.com/office/drawing/2014/main" id="{DA1C2B8B-F7F2-0644-97CD-CC13C532682A}"/>
+              </a:ext>
+            </a:extLst>
+          </p:cNvPr>
+          <p:cNvSpPr/>
+          <p:nvPr/>
+        </p:nvSpPr>
+        <p:spPr>
+          <a:xfrm>
+            <a:off x="4424381" y="3400605"/>
+            <a:ext cx="161924" cy="152396"/>
+          </a:xfrm>
+          <a:prstGeom prst="rect">
+            <a:avLst/>
+          </a:prstGeom>
+        </p:spPr>
+        <p:style>
+          <a:lnRef idx="2">
+            <a:schemeClr val="accent2">
+              <a:shade val="15000"/>
+            </a:schemeClr>
+          </a:lnRef>
+          <a:fillRef idx="1">
+            <a:schemeClr val="accent2"/>
+          </a:fillRef>
+          <a:effectRef idx="0">
+            <a:schemeClr val="accent2"/>
+          </a:effectRef>
+          <a:fontRef idx="minor">
+            <a:schemeClr val="lt1"/>
+          </a:fontRef>
+        </p:style>
+        <p:txBody>
+          <a:bodyPr rtlCol="0" anchor="ctr"/>
+          <a:lstStyle/>
+          <a:p>
+            <a:pPr algn="ctr"/>
+            <a:endParaRPr lang="ko-KR" altLang="en-US" dirty="0"/>
+          </a:p>
+        </p:txBody>
+      </p:sp>
+      <p:sp>
+        <p:nvSpPr>
+          <p:cNvPr id="23" name="직사각형 22">
+            <a:extLst>
+              <a:ext uri="{FF2B5EF4-FFF2-40B4-BE49-F238E27FC236}">
+                <a16:creationId xmlns:a16="http://schemas.microsoft.com/office/drawing/2014/main" id="{D34BE8D4-BAED-1550-0969-D865940CBAEC}"/>
+              </a:ext>
+            </a:extLst>
+          </p:cNvPr>
+          <p:cNvSpPr/>
+          <p:nvPr/>
+        </p:nvSpPr>
+        <p:spPr>
+          <a:xfrm>
+            <a:off x="3093355" y="4419848"/>
+            <a:ext cx="161924" cy="152396"/>
+          </a:xfrm>
+          <a:prstGeom prst="rect">
+            <a:avLst/>
+          </a:prstGeom>
+        </p:spPr>
+        <p:style>
+          <a:lnRef idx="2">
+            <a:schemeClr val="accent2">
+              <a:shade val="15000"/>
+            </a:schemeClr>
+          </a:lnRef>
+          <a:fillRef idx="1">
+            <a:schemeClr val="accent2"/>
+          </a:fillRef>
+          <a:effectRef idx="0">
+            <a:schemeClr val="accent2"/>
+          </a:effectRef>
+          <a:fontRef idx="minor">
+            <a:schemeClr val="lt1"/>
+          </a:fontRef>
+        </p:style>
+        <p:txBody>
+          <a:bodyPr rtlCol="0" anchor="ctr"/>
+          <a:lstStyle/>
+          <a:p>
+            <a:pPr algn="ctr"/>
+            <a:endParaRPr lang="ko-KR" altLang="en-US"/>
+          </a:p>
+        </p:txBody>
+      </p:sp>
+      <p:sp>
+        <p:nvSpPr>
+          <p:cNvPr id="48" name="직사각형 47">
+            <a:extLst>
+              <a:ext uri="{FF2B5EF4-FFF2-40B4-BE49-F238E27FC236}">
+                <a16:creationId xmlns:a16="http://schemas.microsoft.com/office/drawing/2014/main" id="{76904EA5-11B6-0907-1665-985863387B71}"/>
+              </a:ext>
+            </a:extLst>
+          </p:cNvPr>
+          <p:cNvSpPr/>
+          <p:nvPr/>
+        </p:nvSpPr>
+        <p:spPr>
+          <a:xfrm>
+            <a:off x="7721075" y="3579505"/>
+            <a:ext cx="347662" cy="200055"/>
+          </a:xfrm>
+          <a:prstGeom prst="rect">
+            <a:avLst/>
+          </a:prstGeom>
+        </p:spPr>
+        <p:style>
+          <a:lnRef idx="2">
+            <a:schemeClr val="accent1">
+              <a:shade val="15000"/>
+            </a:schemeClr>
+          </a:lnRef>
+          <a:fillRef idx="1">
+            <a:schemeClr val="accent1"/>
+          </a:fillRef>
+          <a:effectRef idx="0">
+            <a:schemeClr val="accent1"/>
+          </a:effectRef>
+          <a:fontRef idx="minor">
+            <a:schemeClr val="lt1"/>
+          </a:fontRef>
+        </p:style>
+        <p:txBody>
+          <a:bodyPr rtlCol="0" anchor="ctr"/>
+          <a:lstStyle/>
+          <a:p>
+            <a:pPr algn="ctr"/>
+            <a:endParaRPr lang="ko-KR" altLang="en-US"/>
+          </a:p>
+        </p:txBody>
+      </p:sp>
+      <p:sp>
+        <p:nvSpPr>
+          <p:cNvPr id="49" name="직사각형 48">
+            <a:extLst>
+              <a:ext uri="{FF2B5EF4-FFF2-40B4-BE49-F238E27FC236}">
+                <a16:creationId xmlns:a16="http://schemas.microsoft.com/office/drawing/2014/main" id="{ECE4ECEA-851B-04F4-3C08-1E7CE935AEC0}"/>
+              </a:ext>
+            </a:extLst>
+          </p:cNvPr>
+          <p:cNvSpPr/>
+          <p:nvPr/>
+        </p:nvSpPr>
+        <p:spPr>
+          <a:xfrm>
+            <a:off x="10160703" y="3581986"/>
+            <a:ext cx="347662" cy="200055"/>
+          </a:xfrm>
+          <a:prstGeom prst="rect">
+            <a:avLst/>
+          </a:prstGeom>
+        </p:spPr>
+        <p:style>
+          <a:lnRef idx="2">
+            <a:schemeClr val="accent1">
+              <a:shade val="15000"/>
+            </a:schemeClr>
+          </a:lnRef>
+          <a:fillRef idx="1">
+            <a:schemeClr val="accent1"/>
+          </a:fillRef>
+          <a:effectRef idx="0">
+            <a:schemeClr val="accent1"/>
+          </a:effectRef>
+          <a:fontRef idx="minor">
+            <a:schemeClr val="lt1"/>
+          </a:fontRef>
+        </p:style>
+        <p:txBody>
+          <a:bodyPr rtlCol="0" anchor="ctr"/>
+          <a:lstStyle/>
+          <a:p>
+            <a:pPr algn="ctr"/>
+            <a:endParaRPr lang="ko-KR" altLang="en-US"/>
+          </a:p>
+        </p:txBody>
+      </p:sp>
+      <p:sp>
+        <p:nvSpPr>
+          <p:cNvPr id="52" name="직사각형 51">
+            <a:extLst>
+              <a:ext uri="{FF2B5EF4-FFF2-40B4-BE49-F238E27FC236}">
+                <a16:creationId xmlns:a16="http://schemas.microsoft.com/office/drawing/2014/main" id="{82A73802-6B51-134C-CE48-455073C8E3A2}"/>
+              </a:ext>
+            </a:extLst>
+          </p:cNvPr>
+          <p:cNvSpPr/>
+          <p:nvPr/>
+        </p:nvSpPr>
+        <p:spPr>
+          <a:xfrm>
+            <a:off x="7218403" y="3600450"/>
+            <a:ext cx="161924" cy="152396"/>
+          </a:xfrm>
+          <a:prstGeom prst="rect">
+            <a:avLst/>
+          </a:prstGeom>
+        </p:spPr>
+        <p:style>
+          <a:lnRef idx="2">
+            <a:schemeClr val="accent2">
+              <a:shade val="15000"/>
+            </a:schemeClr>
+          </a:lnRef>
+          <a:fillRef idx="1">
+            <a:schemeClr val="accent2"/>
+          </a:fillRef>
+          <a:effectRef idx="0">
+            <a:schemeClr val="accent2"/>
+          </a:effectRef>
+          <a:fontRef idx="minor">
+            <a:schemeClr val="lt1"/>
+          </a:fontRef>
+        </p:style>
+        <p:txBody>
+          <a:bodyPr rtlCol="0" anchor="ctr"/>
+          <a:lstStyle/>
+          <a:p>
+            <a:pPr algn="ctr"/>
+            <a:endParaRPr lang="ko-KR" altLang="en-US"/>
+          </a:p>
+        </p:txBody>
+      </p:sp>
+      <p:sp>
+        <p:nvSpPr>
+          <p:cNvPr id="53" name="직사각형 52">
+            <a:extLst>
+              <a:ext uri="{FF2B5EF4-FFF2-40B4-BE49-F238E27FC236}">
+                <a16:creationId xmlns:a16="http://schemas.microsoft.com/office/drawing/2014/main" id="{8BE90451-B33F-4CD1-8F7E-FE1C2B27FA7C}"/>
+              </a:ext>
+            </a:extLst>
+          </p:cNvPr>
+          <p:cNvSpPr/>
+          <p:nvPr/>
+        </p:nvSpPr>
+        <p:spPr>
+          <a:xfrm>
+            <a:off x="10864766" y="3600450"/>
+            <a:ext cx="161924" cy="152396"/>
+          </a:xfrm>
+          <a:prstGeom prst="rect">
+            <a:avLst/>
+          </a:prstGeom>
+        </p:spPr>
+        <p:style>
+          <a:lnRef idx="2">
+            <a:schemeClr val="accent2">
+              <a:shade val="15000"/>
+            </a:schemeClr>
+          </a:lnRef>
+          <a:fillRef idx="1">
+            <a:schemeClr val="accent2"/>
+          </a:fillRef>
+          <a:effectRef idx="0">
+            <a:schemeClr val="accent2"/>
+          </a:effectRef>
+          <a:fontRef idx="minor">
+            <a:schemeClr val="lt1"/>
+          </a:fontRef>
+        </p:style>
+        <p:txBody>
+          <a:bodyPr rtlCol="0" anchor="ctr"/>
+          <a:lstStyle/>
+          <a:p>
+            <a:pPr algn="ctr"/>
+            <a:endParaRPr lang="ko-KR" altLang="en-US"/>
+          </a:p>
+        </p:txBody>
+      </p:sp>
+      <p:sp>
+        <p:nvSpPr>
+          <p:cNvPr id="54" name="직사각형 53">
+            <a:extLst>
+              <a:ext uri="{FF2B5EF4-FFF2-40B4-BE49-F238E27FC236}">
+                <a16:creationId xmlns:a16="http://schemas.microsoft.com/office/drawing/2014/main" id="{B403EF63-EA06-DAED-EFBE-75F413FD7123}"/>
+              </a:ext>
+            </a:extLst>
+          </p:cNvPr>
+          <p:cNvSpPr/>
+          <p:nvPr/>
+        </p:nvSpPr>
+        <p:spPr>
+          <a:xfrm>
+            <a:off x="8995037" y="5270651"/>
+            <a:ext cx="161924" cy="152396"/>
+          </a:xfrm>
+          <a:prstGeom prst="rect">
+            <a:avLst/>
+          </a:prstGeom>
+        </p:spPr>
+        <p:style>
+          <a:lnRef idx="2">
+            <a:schemeClr val="accent2">
+              <a:shade val="15000"/>
+            </a:schemeClr>
+          </a:lnRef>
+          <a:fillRef idx="1">
+            <a:schemeClr val="accent2"/>
+          </a:fillRef>
+          <a:effectRef idx="0">
+            <a:schemeClr val="accent2"/>
+          </a:effectRef>
+          <a:fontRef idx="minor">
+            <a:schemeClr val="lt1"/>
+          </a:fontRef>
+        </p:style>
+        <p:txBody>
+          <a:bodyPr rtlCol="0" anchor="ctr"/>
+          <a:lstStyle/>
+          <a:p>
+            <a:pPr algn="ctr"/>
+            <a:endParaRPr lang="ko-KR" altLang="en-US"/>
+          </a:p>
+        </p:txBody>
+      </p:sp>
+      <p:sp>
+        <p:nvSpPr>
+          <p:cNvPr id="55" name="직사각형 54">
+            <a:extLst>
+              <a:ext uri="{FF2B5EF4-FFF2-40B4-BE49-F238E27FC236}">
+                <a16:creationId xmlns:a16="http://schemas.microsoft.com/office/drawing/2014/main" id="{9C21A153-B984-A64F-8C98-E7DEA1D7B99D}"/>
+              </a:ext>
+            </a:extLst>
+          </p:cNvPr>
+          <p:cNvSpPr/>
+          <p:nvPr/>
+        </p:nvSpPr>
+        <p:spPr>
+          <a:xfrm>
+            <a:off x="9027036" y="1958734"/>
+            <a:ext cx="161924" cy="152396"/>
+          </a:xfrm>
+          <a:prstGeom prst="rect">
+            <a:avLst/>
+          </a:prstGeom>
+        </p:spPr>
+        <p:style>
+          <a:lnRef idx="2">
+            <a:schemeClr val="accent2">
+              <a:shade val="15000"/>
+            </a:schemeClr>
+          </a:lnRef>
+          <a:fillRef idx="1">
+            <a:schemeClr val="accent2"/>
+          </a:fillRef>
+          <a:effectRef idx="0">
+            <a:schemeClr val="accent2"/>
+          </a:effectRef>
+          <a:fontRef idx="minor">
+            <a:schemeClr val="lt1"/>
+          </a:fontRef>
+        </p:style>
+        <p:txBody>
+          <a:bodyPr rtlCol="0" anchor="ctr"/>
+          <a:lstStyle/>
+          <a:p>
+            <a:pPr algn="ctr"/>
+            <a:endParaRPr lang="ko-KR" altLang="en-US"/>
+          </a:p>
+        </p:txBody>
+      </p:sp>
+      <p:sp>
+        <p:nvSpPr>
+          <p:cNvPr id="5" name="직사각형 4">
+            <a:extLst>
+              <a:ext uri="{FF2B5EF4-FFF2-40B4-BE49-F238E27FC236}">
+                <a16:creationId xmlns:a16="http://schemas.microsoft.com/office/drawing/2014/main" id="{25117B80-36BF-23F7-3CFC-3815548E79E0}"/>
+              </a:ext>
+            </a:extLst>
+          </p:cNvPr>
+          <p:cNvSpPr/>
+          <p:nvPr/>
+        </p:nvSpPr>
+        <p:spPr>
+          <a:xfrm>
+            <a:off x="1118796" y="3794761"/>
+            <a:ext cx="542924" cy="523875"/>
           </a:xfrm>
           <a:prstGeom prst="rect">
             <a:avLst/>
@@ -4323,16 +5560,16 @@
           <a:lstStyle/>
           <a:p>
             <a:pPr algn="ctr"/>
-            <a:endParaRPr lang="ko-KR" altLang="en-US"/>
-          </a:p>
-        </p:txBody>
-      </p:sp>
-      <p:sp>
-        <p:nvSpPr>
-          <p:cNvPr id="17" name="직사각형 16">
-            <a:extLst>
-              <a:ext uri="{FF2B5EF4-FFF2-40B4-BE49-F238E27FC236}">
-                <a16:creationId xmlns:a16="http://schemas.microsoft.com/office/drawing/2014/main" id="{C5A1170D-31BE-63F2-02DB-E9B017E3540C}"/>
+            <a:endParaRPr lang="ko-KR" altLang="en-US" dirty="0"/>
+          </a:p>
+        </p:txBody>
+      </p:sp>
+      <p:sp>
+        <p:nvSpPr>
+          <p:cNvPr id="10" name="직사각형 9">
+            <a:extLst>
+              <a:ext uri="{FF2B5EF4-FFF2-40B4-BE49-F238E27FC236}">
+                <a16:creationId xmlns:a16="http://schemas.microsoft.com/office/drawing/2014/main" id="{E78BF425-65A0-38D3-789B-45789FCDE678}"/>
               </a:ext>
             </a:extLst>
           </p:cNvPr>
@@ -4341,8 +5578,8 @@
         </p:nvSpPr>
         <p:spPr>
           <a:xfrm>
-            <a:off x="10521426" y="3248025"/>
-            <a:ext cx="857249" cy="857250"/>
+            <a:off x="4729103" y="3794761"/>
+            <a:ext cx="542924" cy="523875"/>
           </a:xfrm>
           <a:prstGeom prst="rect">
             <a:avLst/>
@@ -4375,10 +5612,10 @@
       </p:sp>
       <p:sp>
         <p:nvSpPr>
-          <p:cNvPr id="18" name="직사각형 17">
-            <a:extLst>
-              <a:ext uri="{FF2B5EF4-FFF2-40B4-BE49-F238E27FC236}">
-                <a16:creationId xmlns:a16="http://schemas.microsoft.com/office/drawing/2014/main" id="{AB29C06F-E499-8CFD-4687-D1A9012F1E26}"/>
+          <p:cNvPr id="4" name="직사각형 3">
+            <a:extLst>
+              <a:ext uri="{FF2B5EF4-FFF2-40B4-BE49-F238E27FC236}">
+                <a16:creationId xmlns:a16="http://schemas.microsoft.com/office/drawing/2014/main" id="{060F7D6E-A24F-CC4C-17CC-0788A64EA00C}"/>
               </a:ext>
             </a:extLst>
           </p:cNvPr>
@@ -4387,8 +5624,8 @@
         </p:nvSpPr>
         <p:spPr>
           <a:xfrm>
-            <a:off x="8669765" y="4918224"/>
-            <a:ext cx="857249" cy="857250"/>
+            <a:off x="2112395" y="4697492"/>
+            <a:ext cx="542924" cy="523875"/>
           </a:xfrm>
           <a:prstGeom prst="rect">
             <a:avLst/>
@@ -4415,16 +5652,16 @@
           <a:lstStyle/>
           <a:p>
             <a:pPr algn="ctr"/>
-            <a:endParaRPr lang="ko-KR" altLang="en-US"/>
-          </a:p>
-        </p:txBody>
-      </p:sp>
-      <p:sp>
-        <p:nvSpPr>
-          <p:cNvPr id="19" name="직사각형 18">
-            <a:extLst>
-              <a:ext uri="{FF2B5EF4-FFF2-40B4-BE49-F238E27FC236}">
-                <a16:creationId xmlns:a16="http://schemas.microsoft.com/office/drawing/2014/main" id="{48D12741-3D4F-2D2D-C33E-66B28B84B446}"/>
+            <a:endParaRPr lang="ko-KR" altLang="en-US" dirty="0"/>
+          </a:p>
+        </p:txBody>
+      </p:sp>
+      <p:sp>
+        <p:nvSpPr>
+          <p:cNvPr id="11" name="직사각형 10">
+            <a:extLst>
+              <a:ext uri="{FF2B5EF4-FFF2-40B4-BE49-F238E27FC236}">
+                <a16:creationId xmlns:a16="http://schemas.microsoft.com/office/drawing/2014/main" id="{CC06ADE7-B03B-CA59-E568-ABCF26775240}"/>
               </a:ext>
             </a:extLst>
           </p:cNvPr>
@@ -4433,8 +5670,8 @@
         </p:nvSpPr>
         <p:spPr>
           <a:xfrm>
-            <a:off x="6863825" y="3248025"/>
-            <a:ext cx="857249" cy="857250"/>
+            <a:off x="3677844" y="4697492"/>
+            <a:ext cx="542924" cy="523875"/>
           </a:xfrm>
           <a:prstGeom prst="rect">
             <a:avLst/>
@@ -4479,8 +5716,8 @@
         </p:nvSpPr>
         <p:spPr>
           <a:xfrm>
-            <a:off x="2776541" y="5897877"/>
-            <a:ext cx="709612" cy="923925"/>
+            <a:off x="2805463" y="5582158"/>
+            <a:ext cx="709612" cy="834227"/>
           </a:xfrm>
           <a:prstGeom prst="rect">
             <a:avLst/>
@@ -4513,10 +5750,10 @@
       </p:sp>
       <p:sp>
         <p:nvSpPr>
-          <p:cNvPr id="25" name="직사각형 24">
-            <a:extLst>
-              <a:ext uri="{FF2B5EF4-FFF2-40B4-BE49-F238E27FC236}">
-                <a16:creationId xmlns:a16="http://schemas.microsoft.com/office/drawing/2014/main" id="{CE710DE1-CE55-1057-99DD-D93FA2067D63}"/>
+          <p:cNvPr id="30" name="직사각형 29">
+            <a:extLst>
+              <a:ext uri="{FF2B5EF4-FFF2-40B4-BE49-F238E27FC236}">
+                <a16:creationId xmlns:a16="http://schemas.microsoft.com/office/drawing/2014/main" id="{6D7986B4-920F-1138-148A-6C61327E3031}"/>
               </a:ext>
             </a:extLst>
           </p:cNvPr>
@@ -4525,8 +5762,8 @@
         </p:nvSpPr>
         <p:spPr>
           <a:xfrm>
-            <a:off x="2559841" y="5139697"/>
-            <a:ext cx="1107285" cy="45719"/>
+            <a:off x="2614648" y="2952469"/>
+            <a:ext cx="1105236" cy="1000517"/>
           </a:xfrm>
           <a:prstGeom prst="rect">
             <a:avLst/>
@@ -4534,15 +5771,15 @@
         </p:spPr>
         <p:style>
           <a:lnRef idx="2">
-            <a:schemeClr val="accent1">
+            <a:schemeClr val="dk1">
               <a:shade val="15000"/>
             </a:schemeClr>
           </a:lnRef>
           <a:fillRef idx="1">
-            <a:schemeClr val="accent1"/>
+            <a:schemeClr val="dk1"/>
           </a:fillRef>
           <a:effectRef idx="0">
-            <a:schemeClr val="accent1"/>
+            <a:schemeClr val="dk1"/>
           </a:effectRef>
           <a:fontRef idx="minor">
             <a:schemeClr val="lt1"/>
@@ -4553,1295 +5790,7 @@
           <a:lstStyle/>
           <a:p>
             <a:pPr algn="ctr"/>
-            <a:endParaRPr lang="ko-KR" altLang="en-US"/>
-          </a:p>
-        </p:txBody>
-      </p:sp>
-      <p:sp>
-        <p:nvSpPr>
-          <p:cNvPr id="26" name="직사각형 25">
-            <a:extLst>
-              <a:ext uri="{FF2B5EF4-FFF2-40B4-BE49-F238E27FC236}">
-                <a16:creationId xmlns:a16="http://schemas.microsoft.com/office/drawing/2014/main" id="{18F3C89D-3689-24D8-6191-87B98CEF01C8}"/>
-              </a:ext>
-            </a:extLst>
-          </p:cNvPr>
-          <p:cNvSpPr/>
-          <p:nvPr/>
-        </p:nvSpPr>
-        <p:spPr>
-          <a:xfrm rot="5400000" flipV="1">
-            <a:off x="2790832" y="5518787"/>
-            <a:ext cx="712460" cy="45719"/>
-          </a:xfrm>
-          <a:prstGeom prst="rect">
-            <a:avLst/>
-          </a:prstGeom>
-        </p:spPr>
-        <p:style>
-          <a:lnRef idx="2">
-            <a:schemeClr val="accent1">
-              <a:shade val="15000"/>
-            </a:schemeClr>
-          </a:lnRef>
-          <a:fillRef idx="1">
-            <a:schemeClr val="accent1"/>
-          </a:fillRef>
-          <a:effectRef idx="0">
-            <a:schemeClr val="accent1"/>
-          </a:effectRef>
-          <a:fontRef idx="minor">
-            <a:schemeClr val="lt1"/>
-          </a:fontRef>
-        </p:style>
-        <p:txBody>
-          <a:bodyPr rtlCol="0" anchor="ctr"/>
-          <a:lstStyle/>
-          <a:p>
-            <a:pPr algn="ctr"/>
-            <a:endParaRPr lang="ko-KR" altLang="en-US"/>
-          </a:p>
-        </p:txBody>
-      </p:sp>
-      <p:sp>
-        <p:nvSpPr>
-          <p:cNvPr id="27" name="직사각형 26">
-            <a:extLst>
-              <a:ext uri="{FF2B5EF4-FFF2-40B4-BE49-F238E27FC236}">
-                <a16:creationId xmlns:a16="http://schemas.microsoft.com/office/drawing/2014/main" id="{BDCF82A1-0D95-2D34-0806-36EAE1A18294}"/>
-              </a:ext>
-            </a:extLst>
-          </p:cNvPr>
-          <p:cNvSpPr/>
-          <p:nvPr/>
-        </p:nvSpPr>
-        <p:spPr>
-          <a:xfrm rot="5400000" flipV="1">
-            <a:off x="3081759" y="2772197"/>
-            <a:ext cx="45719" cy="2982389"/>
-          </a:xfrm>
-          <a:prstGeom prst="rect">
-            <a:avLst/>
-          </a:prstGeom>
-        </p:spPr>
-        <p:style>
-          <a:lnRef idx="2">
-            <a:schemeClr val="accent1">
-              <a:shade val="15000"/>
-            </a:schemeClr>
-          </a:lnRef>
-          <a:fillRef idx="1">
-            <a:schemeClr val="accent1"/>
-          </a:fillRef>
-          <a:effectRef idx="0">
-            <a:schemeClr val="accent1"/>
-          </a:effectRef>
-          <a:fontRef idx="minor">
-            <a:schemeClr val="lt1"/>
-          </a:fontRef>
-        </p:style>
-        <p:txBody>
-          <a:bodyPr rtlCol="0" anchor="ctr"/>
-          <a:lstStyle/>
-          <a:p>
-            <a:pPr algn="ctr"/>
-            <a:endParaRPr lang="ko-KR" altLang="en-US"/>
-          </a:p>
-        </p:txBody>
-      </p:sp>
-      <p:sp>
-        <p:nvSpPr>
-          <p:cNvPr id="28" name="직사각형 27">
-            <a:extLst>
-              <a:ext uri="{FF2B5EF4-FFF2-40B4-BE49-F238E27FC236}">
-                <a16:creationId xmlns:a16="http://schemas.microsoft.com/office/drawing/2014/main" id="{A92E9680-7757-62CA-843E-44607B37C646}"/>
-              </a:ext>
-            </a:extLst>
-          </p:cNvPr>
-          <p:cNvSpPr/>
-          <p:nvPr/>
-        </p:nvSpPr>
-        <p:spPr>
-          <a:xfrm rot="5400000" flipV="1">
-            <a:off x="896070" y="3474480"/>
-            <a:ext cx="2841769" cy="45720"/>
-          </a:xfrm>
-          <a:prstGeom prst="rect">
-            <a:avLst/>
-          </a:prstGeom>
-        </p:spPr>
-        <p:style>
-          <a:lnRef idx="2">
-            <a:schemeClr val="accent1">
-              <a:shade val="15000"/>
-            </a:schemeClr>
-          </a:lnRef>
-          <a:fillRef idx="1">
-            <a:schemeClr val="accent1"/>
-          </a:fillRef>
-          <a:effectRef idx="0">
-            <a:schemeClr val="accent1"/>
-          </a:effectRef>
-          <a:fontRef idx="minor">
-            <a:schemeClr val="lt1"/>
-          </a:fontRef>
-        </p:style>
-        <p:txBody>
-          <a:bodyPr rtlCol="0" anchor="ctr"/>
-          <a:lstStyle/>
-          <a:p>
-            <a:pPr algn="ctr"/>
-            <a:endParaRPr lang="ko-KR" altLang="en-US"/>
-          </a:p>
-        </p:txBody>
-      </p:sp>
-      <p:sp>
-        <p:nvSpPr>
-          <p:cNvPr id="32" name="직사각형 31">
-            <a:extLst>
-              <a:ext uri="{FF2B5EF4-FFF2-40B4-BE49-F238E27FC236}">
-                <a16:creationId xmlns:a16="http://schemas.microsoft.com/office/drawing/2014/main" id="{1A2FDEDF-79DE-F1AF-0F38-83EEB41C352B}"/>
-              </a:ext>
-            </a:extLst>
-          </p:cNvPr>
-          <p:cNvSpPr/>
-          <p:nvPr/>
-        </p:nvSpPr>
-        <p:spPr>
-          <a:xfrm rot="5400000" flipV="1">
-            <a:off x="3073075" y="1384759"/>
-            <a:ext cx="52851" cy="3002149"/>
-          </a:xfrm>
-          <a:prstGeom prst="rect">
-            <a:avLst/>
-          </a:prstGeom>
-        </p:spPr>
-        <p:style>
-          <a:lnRef idx="2">
-            <a:schemeClr val="accent1">
-              <a:shade val="15000"/>
-            </a:schemeClr>
-          </a:lnRef>
-          <a:fillRef idx="1">
-            <a:schemeClr val="accent1"/>
-          </a:fillRef>
-          <a:effectRef idx="0">
-            <a:schemeClr val="accent1"/>
-          </a:effectRef>
-          <a:fontRef idx="minor">
-            <a:schemeClr val="lt1"/>
-          </a:fontRef>
-        </p:style>
-        <p:txBody>
-          <a:bodyPr rtlCol="0" anchor="ctr"/>
-          <a:lstStyle/>
-          <a:p>
-            <a:pPr algn="ctr"/>
-            <a:endParaRPr lang="ko-KR" altLang="en-US"/>
-          </a:p>
-        </p:txBody>
-      </p:sp>
-      <p:sp>
-        <p:nvSpPr>
-          <p:cNvPr id="33" name="직사각형 32">
-            <a:extLst>
-              <a:ext uri="{FF2B5EF4-FFF2-40B4-BE49-F238E27FC236}">
-                <a16:creationId xmlns:a16="http://schemas.microsoft.com/office/drawing/2014/main" id="{1A3EE0E6-4EA8-15C5-745E-E30926A77A4E}"/>
-              </a:ext>
-            </a:extLst>
-          </p:cNvPr>
-          <p:cNvSpPr/>
-          <p:nvPr/>
-        </p:nvSpPr>
-        <p:spPr>
-          <a:xfrm rot="5400000" flipV="1">
-            <a:off x="2524732" y="3482098"/>
-            <a:ext cx="2826533" cy="45719"/>
-          </a:xfrm>
-          <a:prstGeom prst="rect">
-            <a:avLst/>
-          </a:prstGeom>
-        </p:spPr>
-        <p:style>
-          <a:lnRef idx="2">
-            <a:schemeClr val="accent1">
-              <a:shade val="15000"/>
-            </a:schemeClr>
-          </a:lnRef>
-          <a:fillRef idx="1">
-            <a:schemeClr val="accent1"/>
-          </a:fillRef>
-          <a:effectRef idx="0">
-            <a:schemeClr val="accent1"/>
-          </a:effectRef>
-          <a:fontRef idx="minor">
-            <a:schemeClr val="lt1"/>
-          </a:fontRef>
-        </p:style>
-        <p:txBody>
-          <a:bodyPr rtlCol="0" anchor="ctr"/>
-          <a:lstStyle/>
-          <a:p>
-            <a:pPr algn="ctr"/>
-            <a:endParaRPr lang="ko-KR" altLang="en-US"/>
-          </a:p>
-        </p:txBody>
-      </p:sp>
-      <p:sp>
-        <p:nvSpPr>
-          <p:cNvPr id="34" name="직사각형 33">
-            <a:extLst>
-              <a:ext uri="{FF2B5EF4-FFF2-40B4-BE49-F238E27FC236}">
-                <a16:creationId xmlns:a16="http://schemas.microsoft.com/office/drawing/2014/main" id="{0E65E258-1B3E-A77B-0B73-9782693F11BE}"/>
-              </a:ext>
-            </a:extLst>
-          </p:cNvPr>
-          <p:cNvSpPr/>
-          <p:nvPr/>
-        </p:nvSpPr>
-        <p:spPr>
-          <a:xfrm rot="5400000" flipV="1">
-            <a:off x="939529" y="3498053"/>
-            <a:ext cx="804862" cy="45719"/>
-          </a:xfrm>
-          <a:prstGeom prst="rect">
-            <a:avLst/>
-          </a:prstGeom>
-        </p:spPr>
-        <p:style>
-          <a:lnRef idx="2">
-            <a:schemeClr val="accent1">
-              <a:shade val="15000"/>
-            </a:schemeClr>
-          </a:lnRef>
-          <a:fillRef idx="1">
-            <a:schemeClr val="accent1"/>
-          </a:fillRef>
-          <a:effectRef idx="0">
-            <a:schemeClr val="accent1"/>
-          </a:effectRef>
-          <a:fontRef idx="minor">
-            <a:schemeClr val="lt1"/>
-          </a:fontRef>
-        </p:style>
-        <p:txBody>
-          <a:bodyPr rtlCol="0" anchor="ctr"/>
-          <a:lstStyle/>
-          <a:p>
-            <a:pPr algn="ctr"/>
-            <a:endParaRPr lang="ko-KR" altLang="en-US"/>
-          </a:p>
-        </p:txBody>
-      </p:sp>
-      <p:sp>
-        <p:nvSpPr>
-          <p:cNvPr id="35" name="직사각형 34">
-            <a:extLst>
-              <a:ext uri="{FF2B5EF4-FFF2-40B4-BE49-F238E27FC236}">
-                <a16:creationId xmlns:a16="http://schemas.microsoft.com/office/drawing/2014/main" id="{601A046C-9130-C36A-BF5E-03FC4445A0C2}"/>
-              </a:ext>
-            </a:extLst>
-          </p:cNvPr>
-          <p:cNvSpPr/>
-          <p:nvPr/>
-        </p:nvSpPr>
-        <p:spPr>
-          <a:xfrm rot="5400000" flipV="1">
-            <a:off x="4487704" y="3498053"/>
-            <a:ext cx="804862" cy="45719"/>
-          </a:xfrm>
-          <a:prstGeom prst="rect">
-            <a:avLst/>
-          </a:prstGeom>
-        </p:spPr>
-        <p:style>
-          <a:lnRef idx="2">
-            <a:schemeClr val="accent1">
-              <a:shade val="15000"/>
-            </a:schemeClr>
-          </a:lnRef>
-          <a:fillRef idx="1">
-            <a:schemeClr val="accent1"/>
-          </a:fillRef>
-          <a:effectRef idx="0">
-            <a:schemeClr val="accent1"/>
-          </a:effectRef>
-          <a:fontRef idx="minor">
-            <a:schemeClr val="lt1"/>
-          </a:fontRef>
-        </p:style>
-        <p:txBody>
-          <a:bodyPr rtlCol="0" anchor="ctr"/>
-          <a:lstStyle/>
-          <a:p>
-            <a:pPr algn="ctr"/>
-            <a:endParaRPr lang="ko-KR" altLang="en-US"/>
-          </a:p>
-        </p:txBody>
-      </p:sp>
-      <p:sp>
-        <p:nvSpPr>
-          <p:cNvPr id="37" name="직사각형 36">
-            <a:extLst>
-              <a:ext uri="{FF2B5EF4-FFF2-40B4-BE49-F238E27FC236}">
-                <a16:creationId xmlns:a16="http://schemas.microsoft.com/office/drawing/2014/main" id="{EED4629B-F01D-5893-1CD1-FCC66AB73100}"/>
-              </a:ext>
-            </a:extLst>
-          </p:cNvPr>
-          <p:cNvSpPr/>
-          <p:nvPr/>
-        </p:nvSpPr>
-        <p:spPr>
-          <a:xfrm>
-            <a:off x="2608009" y="1829753"/>
-            <a:ext cx="1038936" cy="45719"/>
-          </a:xfrm>
-          <a:prstGeom prst="rect">
-            <a:avLst/>
-          </a:prstGeom>
-        </p:spPr>
-        <p:style>
-          <a:lnRef idx="2">
-            <a:schemeClr val="accent1">
-              <a:shade val="15000"/>
-            </a:schemeClr>
-          </a:lnRef>
-          <a:fillRef idx="1">
-            <a:schemeClr val="accent1"/>
-          </a:fillRef>
-          <a:effectRef idx="0">
-            <a:schemeClr val="accent1"/>
-          </a:effectRef>
-          <a:fontRef idx="minor">
-            <a:schemeClr val="lt1"/>
-          </a:fontRef>
-        </p:style>
-        <p:txBody>
-          <a:bodyPr rtlCol="0" anchor="ctr"/>
-          <a:lstStyle/>
-          <a:p>
-            <a:pPr algn="ctr"/>
-            <a:endParaRPr lang="ko-KR" altLang="en-US"/>
-          </a:p>
-        </p:txBody>
-      </p:sp>
-      <p:sp>
-        <p:nvSpPr>
-          <p:cNvPr id="41" name="직사각형 40">
-            <a:extLst>
-              <a:ext uri="{FF2B5EF4-FFF2-40B4-BE49-F238E27FC236}">
-                <a16:creationId xmlns:a16="http://schemas.microsoft.com/office/drawing/2014/main" id="{FA70A4D3-C45A-E567-7F33-C9399431383A}"/>
-              </a:ext>
-            </a:extLst>
-          </p:cNvPr>
-          <p:cNvSpPr/>
-          <p:nvPr/>
-        </p:nvSpPr>
-        <p:spPr>
-          <a:xfrm>
-            <a:off x="1364820" y="3476628"/>
-            <a:ext cx="929275" cy="45719"/>
-          </a:xfrm>
-          <a:prstGeom prst="rect">
-            <a:avLst/>
-          </a:prstGeom>
-        </p:spPr>
-        <p:style>
-          <a:lnRef idx="2">
-            <a:schemeClr val="accent1">
-              <a:shade val="15000"/>
-            </a:schemeClr>
-          </a:lnRef>
-          <a:fillRef idx="1">
-            <a:schemeClr val="accent1"/>
-          </a:fillRef>
-          <a:effectRef idx="0">
-            <a:schemeClr val="accent1"/>
-          </a:effectRef>
-          <a:fontRef idx="minor">
-            <a:schemeClr val="lt1"/>
-          </a:fontRef>
-        </p:style>
-        <p:txBody>
-          <a:bodyPr rtlCol="0" anchor="ctr"/>
-          <a:lstStyle/>
-          <a:p>
-            <a:pPr algn="ctr"/>
-            <a:endParaRPr lang="ko-KR" altLang="en-US"/>
-          </a:p>
-        </p:txBody>
-      </p:sp>
-      <p:sp>
-        <p:nvSpPr>
-          <p:cNvPr id="42" name="직사각형 41">
-            <a:extLst>
-              <a:ext uri="{FF2B5EF4-FFF2-40B4-BE49-F238E27FC236}">
-                <a16:creationId xmlns:a16="http://schemas.microsoft.com/office/drawing/2014/main" id="{A4057DD6-3549-E8CD-9FD8-818007B20196}"/>
-              </a:ext>
-            </a:extLst>
-          </p:cNvPr>
-          <p:cNvSpPr/>
-          <p:nvPr/>
-        </p:nvSpPr>
-        <p:spPr>
-          <a:xfrm rot="5400000">
-            <a:off x="3741733" y="3558058"/>
-            <a:ext cx="1319207" cy="45719"/>
-          </a:xfrm>
-          <a:prstGeom prst="rect">
-            <a:avLst/>
-          </a:prstGeom>
-        </p:spPr>
-        <p:style>
-          <a:lnRef idx="2">
-            <a:schemeClr val="accent1">
-              <a:shade val="15000"/>
-            </a:schemeClr>
-          </a:lnRef>
-          <a:fillRef idx="1">
-            <a:schemeClr val="accent1"/>
-          </a:fillRef>
-          <a:effectRef idx="0">
-            <a:schemeClr val="accent1"/>
-          </a:effectRef>
-          <a:fontRef idx="minor">
-            <a:schemeClr val="lt1"/>
-          </a:fontRef>
-        </p:style>
-        <p:txBody>
-          <a:bodyPr rtlCol="0" anchor="ctr"/>
-          <a:lstStyle/>
-          <a:p>
-            <a:pPr algn="ctr"/>
-            <a:endParaRPr lang="ko-KR" altLang="en-US"/>
-          </a:p>
-        </p:txBody>
-      </p:sp>
-      <p:sp>
-        <p:nvSpPr>
-          <p:cNvPr id="43" name="직사각형 42">
-            <a:extLst>
-              <a:ext uri="{FF2B5EF4-FFF2-40B4-BE49-F238E27FC236}">
-                <a16:creationId xmlns:a16="http://schemas.microsoft.com/office/drawing/2014/main" id="{B9215AC2-7E9A-AE02-45A6-E22E6BCE287F}"/>
-              </a:ext>
-            </a:extLst>
-          </p:cNvPr>
-          <p:cNvSpPr/>
-          <p:nvPr/>
-        </p:nvSpPr>
-        <p:spPr>
-          <a:xfrm>
-            <a:off x="3946404" y="3476616"/>
-            <a:ext cx="929275" cy="45719"/>
-          </a:xfrm>
-          <a:prstGeom prst="rect">
-            <a:avLst/>
-          </a:prstGeom>
-        </p:spPr>
-        <p:style>
-          <a:lnRef idx="2">
-            <a:schemeClr val="accent1">
-              <a:shade val="15000"/>
-            </a:schemeClr>
-          </a:lnRef>
-          <a:fillRef idx="1">
-            <a:schemeClr val="accent1"/>
-          </a:fillRef>
-          <a:effectRef idx="0">
-            <a:schemeClr val="accent1"/>
-          </a:effectRef>
-          <a:fontRef idx="minor">
-            <a:schemeClr val="lt1"/>
-          </a:fontRef>
-        </p:style>
-        <p:txBody>
-          <a:bodyPr rtlCol="0" anchor="ctr"/>
-          <a:lstStyle/>
-          <a:p>
-            <a:pPr algn="ctr"/>
-            <a:endParaRPr lang="ko-KR" altLang="en-US"/>
-          </a:p>
-        </p:txBody>
-      </p:sp>
-      <p:sp>
-        <p:nvSpPr>
-          <p:cNvPr id="44" name="직사각형 43">
-            <a:extLst>
-              <a:ext uri="{FF2B5EF4-FFF2-40B4-BE49-F238E27FC236}">
-                <a16:creationId xmlns:a16="http://schemas.microsoft.com/office/drawing/2014/main" id="{DE5E8BD0-EDD8-3604-37DE-951D0C72EB36}"/>
-              </a:ext>
-            </a:extLst>
-          </p:cNvPr>
-          <p:cNvSpPr/>
-          <p:nvPr/>
-        </p:nvSpPr>
-        <p:spPr>
-          <a:xfrm flipV="1">
-            <a:off x="2329230" y="2325777"/>
-            <a:ext cx="1568505" cy="45719"/>
-          </a:xfrm>
-          <a:prstGeom prst="rect">
-            <a:avLst/>
-          </a:prstGeom>
-        </p:spPr>
-        <p:style>
-          <a:lnRef idx="2">
-            <a:schemeClr val="accent1">
-              <a:shade val="15000"/>
-            </a:schemeClr>
-          </a:lnRef>
-          <a:fillRef idx="1">
-            <a:schemeClr val="accent1"/>
-          </a:fillRef>
-          <a:effectRef idx="0">
-            <a:schemeClr val="accent1"/>
-          </a:effectRef>
-          <a:fontRef idx="minor">
-            <a:schemeClr val="lt1"/>
-          </a:fontRef>
-        </p:style>
-        <p:txBody>
-          <a:bodyPr rtlCol="0" anchor="ctr"/>
-          <a:lstStyle/>
-          <a:p>
-            <a:pPr algn="ctr"/>
-            <a:endParaRPr lang="ko-KR" altLang="en-US"/>
-          </a:p>
-        </p:txBody>
-      </p:sp>
-      <p:sp>
-        <p:nvSpPr>
-          <p:cNvPr id="45" name="직사각형 44">
-            <a:extLst>
-              <a:ext uri="{FF2B5EF4-FFF2-40B4-BE49-F238E27FC236}">
-                <a16:creationId xmlns:a16="http://schemas.microsoft.com/office/drawing/2014/main" id="{91DEAFEE-AB49-83CD-FA71-0962A26FCCC6}"/>
-              </a:ext>
-            </a:extLst>
-          </p:cNvPr>
-          <p:cNvSpPr/>
-          <p:nvPr/>
-        </p:nvSpPr>
-        <p:spPr>
-          <a:xfrm rot="5400000">
-            <a:off x="2698575" y="2344580"/>
-            <a:ext cx="965805" cy="45719"/>
-          </a:xfrm>
-          <a:prstGeom prst="rect">
-            <a:avLst/>
-          </a:prstGeom>
-        </p:spPr>
-        <p:style>
-          <a:lnRef idx="2">
-            <a:schemeClr val="accent1">
-              <a:shade val="15000"/>
-            </a:schemeClr>
-          </a:lnRef>
-          <a:fillRef idx="1">
-            <a:schemeClr val="accent1"/>
-          </a:fillRef>
-          <a:effectRef idx="0">
-            <a:schemeClr val="accent1"/>
-          </a:effectRef>
-          <a:fontRef idx="minor">
-            <a:schemeClr val="lt1"/>
-          </a:fontRef>
-        </p:style>
-        <p:txBody>
-          <a:bodyPr rtlCol="0" anchor="ctr"/>
-          <a:lstStyle/>
-          <a:p>
-            <a:pPr algn="ctr"/>
-            <a:endParaRPr lang="ko-KR" altLang="en-US"/>
-          </a:p>
-        </p:txBody>
-      </p:sp>
-      <p:sp>
-        <p:nvSpPr>
-          <p:cNvPr id="40" name="직사각형 39">
-            <a:extLst>
-              <a:ext uri="{FF2B5EF4-FFF2-40B4-BE49-F238E27FC236}">
-                <a16:creationId xmlns:a16="http://schemas.microsoft.com/office/drawing/2014/main" id="{C53E01BA-99FB-FD12-46F7-A2547A048609}"/>
-              </a:ext>
-            </a:extLst>
-          </p:cNvPr>
-          <p:cNvSpPr/>
-          <p:nvPr/>
-        </p:nvSpPr>
-        <p:spPr>
-          <a:xfrm rot="5400000">
-            <a:off x="1160149" y="3558070"/>
-            <a:ext cx="1319207" cy="45719"/>
-          </a:xfrm>
-          <a:prstGeom prst="rect">
-            <a:avLst/>
-          </a:prstGeom>
-        </p:spPr>
-        <p:style>
-          <a:lnRef idx="2">
-            <a:schemeClr val="accent1">
-              <a:shade val="15000"/>
-            </a:schemeClr>
-          </a:lnRef>
-          <a:fillRef idx="1">
-            <a:schemeClr val="accent1"/>
-          </a:fillRef>
-          <a:effectRef idx="0">
-            <a:schemeClr val="accent1"/>
-          </a:effectRef>
-          <a:fontRef idx="minor">
-            <a:schemeClr val="lt1"/>
-          </a:fontRef>
-        </p:style>
-        <p:txBody>
-          <a:bodyPr rtlCol="0" anchor="ctr"/>
-          <a:lstStyle/>
-          <a:p>
-            <a:pPr algn="ctr"/>
-            <a:endParaRPr lang="ko-KR" altLang="en-US"/>
-          </a:p>
-        </p:txBody>
-      </p:sp>
-      <p:sp>
-        <p:nvSpPr>
-          <p:cNvPr id="20" name="직사각형 19">
-            <a:extLst>
-              <a:ext uri="{FF2B5EF4-FFF2-40B4-BE49-F238E27FC236}">
-                <a16:creationId xmlns:a16="http://schemas.microsoft.com/office/drawing/2014/main" id="{BE06B869-0FAF-C57D-98CE-339AFD2145B5}"/>
-              </a:ext>
-            </a:extLst>
-          </p:cNvPr>
-          <p:cNvSpPr/>
-          <p:nvPr/>
-        </p:nvSpPr>
-        <p:spPr>
-          <a:xfrm>
-            <a:off x="1751426" y="3429000"/>
-            <a:ext cx="161924" cy="152396"/>
-          </a:xfrm>
-          <a:prstGeom prst="rect">
-            <a:avLst/>
-          </a:prstGeom>
-        </p:spPr>
-        <p:style>
-          <a:lnRef idx="2">
-            <a:schemeClr val="accent2">
-              <a:shade val="15000"/>
-            </a:schemeClr>
-          </a:lnRef>
-          <a:fillRef idx="1">
-            <a:schemeClr val="accent2"/>
-          </a:fillRef>
-          <a:effectRef idx="0">
-            <a:schemeClr val="accent2"/>
-          </a:effectRef>
-          <a:fontRef idx="minor">
-            <a:schemeClr val="lt1"/>
-          </a:fontRef>
-        </p:style>
-        <p:txBody>
-          <a:bodyPr rtlCol="0" anchor="ctr"/>
-          <a:lstStyle/>
-          <a:p>
-            <a:pPr algn="ctr"/>
             <a:endParaRPr lang="ko-KR" altLang="en-US" dirty="0"/>
-          </a:p>
-        </p:txBody>
-      </p:sp>
-      <p:sp>
-        <p:nvSpPr>
-          <p:cNvPr id="21" name="직사각형 20">
-            <a:extLst>
-              <a:ext uri="{FF2B5EF4-FFF2-40B4-BE49-F238E27FC236}">
-                <a16:creationId xmlns:a16="http://schemas.microsoft.com/office/drawing/2014/main" id="{307495CC-50AD-751E-AD44-12E37B41D378}"/>
-              </a:ext>
-            </a:extLst>
-          </p:cNvPr>
-          <p:cNvSpPr/>
-          <p:nvPr/>
-        </p:nvSpPr>
-        <p:spPr>
-          <a:xfrm>
-            <a:off x="3102554" y="2266470"/>
-            <a:ext cx="161924" cy="152396"/>
-          </a:xfrm>
-          <a:prstGeom prst="rect">
-            <a:avLst/>
-          </a:prstGeom>
-        </p:spPr>
-        <p:style>
-          <a:lnRef idx="2">
-            <a:schemeClr val="accent2">
-              <a:shade val="15000"/>
-            </a:schemeClr>
-          </a:lnRef>
-          <a:fillRef idx="1">
-            <a:schemeClr val="accent2"/>
-          </a:fillRef>
-          <a:effectRef idx="0">
-            <a:schemeClr val="accent2"/>
-          </a:effectRef>
-          <a:fontRef idx="minor">
-            <a:schemeClr val="lt1"/>
-          </a:fontRef>
-        </p:style>
-        <p:txBody>
-          <a:bodyPr rtlCol="0" anchor="ctr"/>
-          <a:lstStyle/>
-          <a:p>
-            <a:pPr algn="ctr"/>
-            <a:endParaRPr lang="ko-KR" altLang="en-US"/>
-          </a:p>
-        </p:txBody>
-      </p:sp>
-      <p:sp>
-        <p:nvSpPr>
-          <p:cNvPr id="22" name="직사각형 21">
-            <a:extLst>
-              <a:ext uri="{FF2B5EF4-FFF2-40B4-BE49-F238E27FC236}">
-                <a16:creationId xmlns:a16="http://schemas.microsoft.com/office/drawing/2014/main" id="{DA1C2B8B-F7F2-0644-97CD-CC13C532682A}"/>
-              </a:ext>
-            </a:extLst>
-          </p:cNvPr>
-          <p:cNvSpPr/>
-          <p:nvPr/>
-        </p:nvSpPr>
-        <p:spPr>
-          <a:xfrm>
-            <a:off x="4331617" y="3427109"/>
-            <a:ext cx="161924" cy="152396"/>
-          </a:xfrm>
-          <a:prstGeom prst="rect">
-            <a:avLst/>
-          </a:prstGeom>
-        </p:spPr>
-        <p:style>
-          <a:lnRef idx="2">
-            <a:schemeClr val="accent2">
-              <a:shade val="15000"/>
-            </a:schemeClr>
-          </a:lnRef>
-          <a:fillRef idx="1">
-            <a:schemeClr val="accent2"/>
-          </a:fillRef>
-          <a:effectRef idx="0">
-            <a:schemeClr val="accent2"/>
-          </a:effectRef>
-          <a:fontRef idx="minor">
-            <a:schemeClr val="lt1"/>
-          </a:fontRef>
-        </p:style>
-        <p:txBody>
-          <a:bodyPr rtlCol="0" anchor="ctr"/>
-          <a:lstStyle/>
-          <a:p>
-            <a:pPr algn="ctr"/>
-            <a:endParaRPr lang="ko-KR" altLang="en-US" dirty="0"/>
-          </a:p>
-        </p:txBody>
-      </p:sp>
-      <p:sp>
-        <p:nvSpPr>
-          <p:cNvPr id="46" name="직사각형 45">
-            <a:extLst>
-              <a:ext uri="{FF2B5EF4-FFF2-40B4-BE49-F238E27FC236}">
-                <a16:creationId xmlns:a16="http://schemas.microsoft.com/office/drawing/2014/main" id="{BA6888F4-B21F-790F-8762-7FC12A072F7A}"/>
-              </a:ext>
-            </a:extLst>
-          </p:cNvPr>
-          <p:cNvSpPr/>
-          <p:nvPr/>
-        </p:nvSpPr>
-        <p:spPr>
-          <a:xfrm flipV="1">
-            <a:off x="2294093" y="4683930"/>
-            <a:ext cx="1611955" cy="45720"/>
-          </a:xfrm>
-          <a:prstGeom prst="rect">
-            <a:avLst/>
-          </a:prstGeom>
-        </p:spPr>
-        <p:style>
-          <a:lnRef idx="2">
-            <a:schemeClr val="accent1">
-              <a:shade val="15000"/>
-            </a:schemeClr>
-          </a:lnRef>
-          <a:fillRef idx="1">
-            <a:schemeClr val="accent1"/>
-          </a:fillRef>
-          <a:effectRef idx="0">
-            <a:schemeClr val="accent1"/>
-          </a:effectRef>
-          <a:fontRef idx="minor">
-            <a:schemeClr val="lt1"/>
-          </a:fontRef>
-        </p:style>
-        <p:txBody>
-          <a:bodyPr rtlCol="0" anchor="ctr"/>
-          <a:lstStyle/>
-          <a:p>
-            <a:pPr algn="ctr"/>
-            <a:endParaRPr lang="ko-KR" altLang="en-US"/>
-          </a:p>
-        </p:txBody>
-      </p:sp>
-      <p:sp>
-        <p:nvSpPr>
-          <p:cNvPr id="47" name="직사각형 46">
-            <a:extLst>
-              <a:ext uri="{FF2B5EF4-FFF2-40B4-BE49-F238E27FC236}">
-                <a16:creationId xmlns:a16="http://schemas.microsoft.com/office/drawing/2014/main" id="{A8ECEE0B-BB8C-F9F5-308C-3D82B61CE4EF}"/>
-              </a:ext>
-            </a:extLst>
-          </p:cNvPr>
-          <p:cNvSpPr/>
-          <p:nvPr/>
-        </p:nvSpPr>
-        <p:spPr>
-          <a:xfrm rot="5400000">
-            <a:off x="2723713" y="4685120"/>
-            <a:ext cx="863436" cy="45719"/>
-          </a:xfrm>
-          <a:prstGeom prst="rect">
-            <a:avLst/>
-          </a:prstGeom>
-        </p:spPr>
-        <p:style>
-          <a:lnRef idx="2">
-            <a:schemeClr val="accent1">
-              <a:shade val="15000"/>
-            </a:schemeClr>
-          </a:lnRef>
-          <a:fillRef idx="1">
-            <a:schemeClr val="accent1"/>
-          </a:fillRef>
-          <a:effectRef idx="0">
-            <a:schemeClr val="accent1"/>
-          </a:effectRef>
-          <a:fontRef idx="minor">
-            <a:schemeClr val="lt1"/>
-          </a:fontRef>
-        </p:style>
-        <p:txBody>
-          <a:bodyPr rtlCol="0" anchor="ctr"/>
-          <a:lstStyle/>
-          <a:p>
-            <a:pPr algn="ctr"/>
-            <a:endParaRPr lang="ko-KR" altLang="en-US"/>
-          </a:p>
-        </p:txBody>
-      </p:sp>
-      <p:sp>
-        <p:nvSpPr>
-          <p:cNvPr id="23" name="직사각형 22">
-            <a:extLst>
-              <a:ext uri="{FF2B5EF4-FFF2-40B4-BE49-F238E27FC236}">
-                <a16:creationId xmlns:a16="http://schemas.microsoft.com/office/drawing/2014/main" id="{D34BE8D4-BAED-1550-0969-D865940CBAEC}"/>
-              </a:ext>
-            </a:extLst>
-          </p:cNvPr>
-          <p:cNvSpPr/>
-          <p:nvPr/>
-        </p:nvSpPr>
-        <p:spPr>
-          <a:xfrm>
-            <a:off x="3088960" y="4648202"/>
-            <a:ext cx="161924" cy="152396"/>
-          </a:xfrm>
-          <a:prstGeom prst="rect">
-            <a:avLst/>
-          </a:prstGeom>
-        </p:spPr>
-        <p:style>
-          <a:lnRef idx="2">
-            <a:schemeClr val="accent2">
-              <a:shade val="15000"/>
-            </a:schemeClr>
-          </a:lnRef>
-          <a:fillRef idx="1">
-            <a:schemeClr val="accent2"/>
-          </a:fillRef>
-          <a:effectRef idx="0">
-            <a:schemeClr val="accent2"/>
-          </a:effectRef>
-          <a:fontRef idx="minor">
-            <a:schemeClr val="lt1"/>
-          </a:fontRef>
-        </p:style>
-        <p:txBody>
-          <a:bodyPr rtlCol="0" anchor="ctr"/>
-          <a:lstStyle/>
-          <a:p>
-            <a:pPr algn="ctr"/>
-            <a:endParaRPr lang="ko-KR" altLang="en-US"/>
-          </a:p>
-        </p:txBody>
-      </p:sp>
-      <p:sp>
-        <p:nvSpPr>
-          <p:cNvPr id="48" name="직사각형 47">
-            <a:extLst>
-              <a:ext uri="{FF2B5EF4-FFF2-40B4-BE49-F238E27FC236}">
-                <a16:creationId xmlns:a16="http://schemas.microsoft.com/office/drawing/2014/main" id="{76904EA5-11B6-0907-1665-985863387B71}"/>
-              </a:ext>
-            </a:extLst>
-          </p:cNvPr>
-          <p:cNvSpPr/>
-          <p:nvPr/>
-        </p:nvSpPr>
-        <p:spPr>
-          <a:xfrm>
-            <a:off x="7721075" y="3676649"/>
-            <a:ext cx="347662" cy="45719"/>
-          </a:xfrm>
-          <a:prstGeom prst="rect">
-            <a:avLst/>
-          </a:prstGeom>
-        </p:spPr>
-        <p:style>
-          <a:lnRef idx="2">
-            <a:schemeClr val="accent1">
-              <a:shade val="15000"/>
-            </a:schemeClr>
-          </a:lnRef>
-          <a:fillRef idx="1">
-            <a:schemeClr val="accent1"/>
-          </a:fillRef>
-          <a:effectRef idx="0">
-            <a:schemeClr val="accent1"/>
-          </a:effectRef>
-          <a:fontRef idx="minor">
-            <a:schemeClr val="lt1"/>
-          </a:fontRef>
-        </p:style>
-        <p:txBody>
-          <a:bodyPr rtlCol="0" anchor="ctr"/>
-          <a:lstStyle/>
-          <a:p>
-            <a:pPr algn="ctr"/>
-            <a:endParaRPr lang="ko-KR" altLang="en-US"/>
-          </a:p>
-        </p:txBody>
-      </p:sp>
-      <p:sp>
-        <p:nvSpPr>
-          <p:cNvPr id="49" name="직사각형 48">
-            <a:extLst>
-              <a:ext uri="{FF2B5EF4-FFF2-40B4-BE49-F238E27FC236}">
-                <a16:creationId xmlns:a16="http://schemas.microsoft.com/office/drawing/2014/main" id="{ECE4ECEA-851B-04F4-3C08-1E7CE935AEC0}"/>
-              </a:ext>
-            </a:extLst>
-          </p:cNvPr>
-          <p:cNvSpPr/>
-          <p:nvPr/>
-        </p:nvSpPr>
-        <p:spPr>
-          <a:xfrm>
-            <a:off x="10160703" y="3653789"/>
-            <a:ext cx="347662" cy="45719"/>
-          </a:xfrm>
-          <a:prstGeom prst="rect">
-            <a:avLst/>
-          </a:prstGeom>
-        </p:spPr>
-        <p:style>
-          <a:lnRef idx="2">
-            <a:schemeClr val="accent1">
-              <a:shade val="15000"/>
-            </a:schemeClr>
-          </a:lnRef>
-          <a:fillRef idx="1">
-            <a:schemeClr val="accent1"/>
-          </a:fillRef>
-          <a:effectRef idx="0">
-            <a:schemeClr val="accent1"/>
-          </a:effectRef>
-          <a:fontRef idx="minor">
-            <a:schemeClr val="lt1"/>
-          </a:fontRef>
-        </p:style>
-        <p:txBody>
-          <a:bodyPr rtlCol="0" anchor="ctr"/>
-          <a:lstStyle/>
-          <a:p>
-            <a:pPr algn="ctr"/>
-            <a:endParaRPr lang="ko-KR" altLang="en-US"/>
-          </a:p>
-        </p:txBody>
-      </p:sp>
-      <p:sp>
-        <p:nvSpPr>
-          <p:cNvPr id="50" name="직사각형 49">
-            <a:extLst>
-              <a:ext uri="{FF2B5EF4-FFF2-40B4-BE49-F238E27FC236}">
-                <a16:creationId xmlns:a16="http://schemas.microsoft.com/office/drawing/2014/main" id="{E68F7F6A-CDAA-ACF8-292D-F0CC2ED09018}"/>
-              </a:ext>
-            </a:extLst>
-          </p:cNvPr>
-          <p:cNvSpPr/>
-          <p:nvPr/>
-        </p:nvSpPr>
-        <p:spPr>
-          <a:xfrm rot="5400000">
-            <a:off x="8971949" y="4746065"/>
-            <a:ext cx="298602" cy="45719"/>
-          </a:xfrm>
-          <a:prstGeom prst="rect">
-            <a:avLst/>
-          </a:prstGeom>
-        </p:spPr>
-        <p:style>
-          <a:lnRef idx="2">
-            <a:schemeClr val="accent1">
-              <a:shade val="15000"/>
-            </a:schemeClr>
-          </a:lnRef>
-          <a:fillRef idx="1">
-            <a:schemeClr val="accent1"/>
-          </a:fillRef>
-          <a:effectRef idx="0">
-            <a:schemeClr val="accent1"/>
-          </a:effectRef>
-          <a:fontRef idx="minor">
-            <a:schemeClr val="lt1"/>
-          </a:fontRef>
-        </p:style>
-        <p:txBody>
-          <a:bodyPr rtlCol="0" anchor="ctr"/>
-          <a:lstStyle/>
-          <a:p>
-            <a:pPr algn="ctr"/>
-            <a:endParaRPr lang="ko-KR" altLang="en-US"/>
-          </a:p>
-        </p:txBody>
-      </p:sp>
-      <p:sp>
-        <p:nvSpPr>
-          <p:cNvPr id="51" name="직사각형 50">
-            <a:extLst>
-              <a:ext uri="{FF2B5EF4-FFF2-40B4-BE49-F238E27FC236}">
-                <a16:creationId xmlns:a16="http://schemas.microsoft.com/office/drawing/2014/main" id="{3B1F2ACC-EA18-470C-57BC-103ED12639CD}"/>
-              </a:ext>
-            </a:extLst>
-          </p:cNvPr>
-          <p:cNvSpPr/>
-          <p:nvPr/>
-        </p:nvSpPr>
-        <p:spPr>
-          <a:xfrm rot="5400000">
-            <a:off x="8934856" y="2561515"/>
-            <a:ext cx="298602" cy="45719"/>
-          </a:xfrm>
-          <a:prstGeom prst="rect">
-            <a:avLst/>
-          </a:prstGeom>
-        </p:spPr>
-        <p:style>
-          <a:lnRef idx="2">
-            <a:schemeClr val="accent1">
-              <a:shade val="15000"/>
-            </a:schemeClr>
-          </a:lnRef>
-          <a:fillRef idx="1">
-            <a:schemeClr val="accent1"/>
-          </a:fillRef>
-          <a:effectRef idx="0">
-            <a:schemeClr val="accent1"/>
-          </a:effectRef>
-          <a:fontRef idx="minor">
-            <a:schemeClr val="lt1"/>
-          </a:fontRef>
-        </p:style>
-        <p:txBody>
-          <a:bodyPr rtlCol="0" anchor="ctr"/>
-          <a:lstStyle/>
-          <a:p>
-            <a:pPr algn="ctr"/>
-            <a:endParaRPr lang="ko-KR" altLang="en-US"/>
-          </a:p>
-        </p:txBody>
-      </p:sp>
-      <p:sp>
-        <p:nvSpPr>
-          <p:cNvPr id="52" name="직사각형 51">
-            <a:extLst>
-              <a:ext uri="{FF2B5EF4-FFF2-40B4-BE49-F238E27FC236}">
-                <a16:creationId xmlns:a16="http://schemas.microsoft.com/office/drawing/2014/main" id="{82A73802-6B51-134C-CE48-455073C8E3A2}"/>
-              </a:ext>
-            </a:extLst>
-          </p:cNvPr>
-          <p:cNvSpPr/>
-          <p:nvPr/>
-        </p:nvSpPr>
-        <p:spPr>
-          <a:xfrm>
-            <a:off x="7218403" y="3600450"/>
-            <a:ext cx="161924" cy="152396"/>
-          </a:xfrm>
-          <a:prstGeom prst="rect">
-            <a:avLst/>
-          </a:prstGeom>
-        </p:spPr>
-        <p:style>
-          <a:lnRef idx="2">
-            <a:schemeClr val="accent2">
-              <a:shade val="15000"/>
-            </a:schemeClr>
-          </a:lnRef>
-          <a:fillRef idx="1">
-            <a:schemeClr val="accent2"/>
-          </a:fillRef>
-          <a:effectRef idx="0">
-            <a:schemeClr val="accent2"/>
-          </a:effectRef>
-          <a:fontRef idx="minor">
-            <a:schemeClr val="lt1"/>
-          </a:fontRef>
-        </p:style>
-        <p:txBody>
-          <a:bodyPr rtlCol="0" anchor="ctr"/>
-          <a:lstStyle/>
-          <a:p>
-            <a:pPr algn="ctr"/>
-            <a:endParaRPr lang="ko-KR" altLang="en-US"/>
-          </a:p>
-        </p:txBody>
-      </p:sp>
-      <p:sp>
-        <p:nvSpPr>
-          <p:cNvPr id="53" name="직사각형 52">
-            <a:extLst>
-              <a:ext uri="{FF2B5EF4-FFF2-40B4-BE49-F238E27FC236}">
-                <a16:creationId xmlns:a16="http://schemas.microsoft.com/office/drawing/2014/main" id="{8BE90451-B33F-4CD1-8F7E-FE1C2B27FA7C}"/>
-              </a:ext>
-            </a:extLst>
-          </p:cNvPr>
-          <p:cNvSpPr/>
-          <p:nvPr/>
-        </p:nvSpPr>
-        <p:spPr>
-          <a:xfrm>
-            <a:off x="10917774" y="3600450"/>
-            <a:ext cx="161924" cy="152396"/>
-          </a:xfrm>
-          <a:prstGeom prst="rect">
-            <a:avLst/>
-          </a:prstGeom>
-        </p:spPr>
-        <p:style>
-          <a:lnRef idx="2">
-            <a:schemeClr val="accent2">
-              <a:shade val="15000"/>
-            </a:schemeClr>
-          </a:lnRef>
-          <a:fillRef idx="1">
-            <a:schemeClr val="accent2"/>
-          </a:fillRef>
-          <a:effectRef idx="0">
-            <a:schemeClr val="accent2"/>
-          </a:effectRef>
-          <a:fontRef idx="minor">
-            <a:schemeClr val="lt1"/>
-          </a:fontRef>
-        </p:style>
-        <p:txBody>
-          <a:bodyPr rtlCol="0" anchor="ctr"/>
-          <a:lstStyle/>
-          <a:p>
-            <a:pPr algn="ctr"/>
-            <a:endParaRPr lang="ko-KR" altLang="en-US"/>
-          </a:p>
-        </p:txBody>
-      </p:sp>
-      <p:sp>
-        <p:nvSpPr>
-          <p:cNvPr id="54" name="직사각형 53">
-            <a:extLst>
-              <a:ext uri="{FF2B5EF4-FFF2-40B4-BE49-F238E27FC236}">
-                <a16:creationId xmlns:a16="http://schemas.microsoft.com/office/drawing/2014/main" id="{B403EF63-EA06-DAED-EFBE-75F413FD7123}"/>
-              </a:ext>
-            </a:extLst>
-          </p:cNvPr>
-          <p:cNvSpPr/>
-          <p:nvPr/>
-        </p:nvSpPr>
-        <p:spPr>
-          <a:xfrm>
-            <a:off x="9061297" y="5270651"/>
-            <a:ext cx="161924" cy="152396"/>
-          </a:xfrm>
-          <a:prstGeom prst="rect">
-            <a:avLst/>
-          </a:prstGeom>
-        </p:spPr>
-        <p:style>
-          <a:lnRef idx="2">
-            <a:schemeClr val="accent2">
-              <a:shade val="15000"/>
-            </a:schemeClr>
-          </a:lnRef>
-          <a:fillRef idx="1">
-            <a:schemeClr val="accent2"/>
-          </a:fillRef>
-          <a:effectRef idx="0">
-            <a:schemeClr val="accent2"/>
-          </a:effectRef>
-          <a:fontRef idx="minor">
-            <a:schemeClr val="lt1"/>
-          </a:fontRef>
-        </p:style>
-        <p:txBody>
-          <a:bodyPr rtlCol="0" anchor="ctr"/>
-          <a:lstStyle/>
-          <a:p>
-            <a:pPr algn="ctr"/>
-            <a:endParaRPr lang="ko-KR" altLang="en-US"/>
-          </a:p>
-        </p:txBody>
-      </p:sp>
-      <p:sp>
-        <p:nvSpPr>
-          <p:cNvPr id="55" name="직사각형 54">
-            <a:extLst>
-              <a:ext uri="{FF2B5EF4-FFF2-40B4-BE49-F238E27FC236}">
-                <a16:creationId xmlns:a16="http://schemas.microsoft.com/office/drawing/2014/main" id="{9C21A153-B984-A64F-8C98-E7DEA1D7B99D}"/>
-              </a:ext>
-            </a:extLst>
-          </p:cNvPr>
-          <p:cNvSpPr/>
-          <p:nvPr/>
-        </p:nvSpPr>
-        <p:spPr>
-          <a:xfrm>
-            <a:off x="9003195" y="1984076"/>
-            <a:ext cx="161924" cy="152396"/>
-          </a:xfrm>
-          <a:prstGeom prst="rect">
-            <a:avLst/>
-          </a:prstGeom>
-        </p:spPr>
-        <p:style>
-          <a:lnRef idx="2">
-            <a:schemeClr val="accent2">
-              <a:shade val="15000"/>
-            </a:schemeClr>
-          </a:lnRef>
-          <a:fillRef idx="1">
-            <a:schemeClr val="accent2"/>
-          </a:fillRef>
-          <a:effectRef idx="0">
-            <a:schemeClr val="accent2"/>
-          </a:effectRef>
-          <a:fontRef idx="minor">
-            <a:schemeClr val="lt1"/>
-          </a:fontRef>
-        </p:style>
-        <p:txBody>
-          <a:bodyPr rtlCol="0" anchor="ctr"/>
-          <a:lstStyle/>
-          <a:p>
-            <a:pPr algn="ctr"/>
-            <a:endParaRPr lang="ko-KR" altLang="en-US"/>
           </a:p>
         </p:txBody>
       </p:sp>
@@ -8146,86 +8095,6 @@
     <p:extLst>
       <p:ext uri="{BB962C8B-B14F-4D97-AF65-F5344CB8AC3E}">
         <p14:creationId xmlns:p14="http://schemas.microsoft.com/office/powerpoint/2010/main" val="3898645251"/>
-      </p:ext>
-    </p:extLst>
-  </p:cSld>
-  <p:clrMapOvr>
-    <a:masterClrMapping/>
-  </p:clrMapOvr>
-</p:sld>
-</file>
-
-<file path=ppt/slides/slide6.xml><?xml version="1.0" encoding="utf-8"?>
-<p:sld xmlns:a="http://schemas.openxmlformats.org/drawingml/2006/main" xmlns:r="http://schemas.openxmlformats.org/officeDocument/2006/relationships" xmlns:p="http://schemas.openxmlformats.org/presentationml/2006/main">
-  <p:cSld>
-    <p:spTree>
-      <p:nvGrpSpPr>
-        <p:cNvPr id="1" name=""/>
-        <p:cNvGrpSpPr/>
-        <p:nvPr/>
-      </p:nvGrpSpPr>
-      <p:grpSpPr>
-        <a:xfrm>
-          <a:off x="0" y="0"/>
-          <a:ext cx="0" cy="0"/>
-          <a:chOff x="0" y="0"/>
-          <a:chExt cx="0" cy="0"/>
-        </a:xfrm>
-      </p:grpSpPr>
-      <p:sp>
-        <p:nvSpPr>
-          <p:cNvPr id="2" name="제목 1">
-            <a:extLst>
-              <a:ext uri="{FF2B5EF4-FFF2-40B4-BE49-F238E27FC236}">
-                <a16:creationId xmlns:a16="http://schemas.microsoft.com/office/drawing/2014/main" id="{34FD695D-5546-8E96-2602-E011A1190F34}"/>
-              </a:ext>
-            </a:extLst>
-          </p:cNvPr>
-          <p:cNvSpPr>
-            <a:spLocks noGrp="1"/>
-          </p:cNvSpPr>
-          <p:nvPr>
-            <p:ph type="title"/>
-          </p:nvPr>
-        </p:nvSpPr>
-        <p:spPr/>
-        <p:txBody>
-          <a:bodyPr/>
-          <a:lstStyle/>
-          <a:p>
-            <a:endParaRPr lang="ko-KR" altLang="en-US"/>
-          </a:p>
-        </p:txBody>
-      </p:sp>
-      <p:sp>
-        <p:nvSpPr>
-          <p:cNvPr id="3" name="내용 개체 틀 2">
-            <a:extLst>
-              <a:ext uri="{FF2B5EF4-FFF2-40B4-BE49-F238E27FC236}">
-                <a16:creationId xmlns:a16="http://schemas.microsoft.com/office/drawing/2014/main" id="{A4A36BA3-CA99-0A3D-3A50-A9DEC64CB9C7}"/>
-              </a:ext>
-            </a:extLst>
-          </p:cNvPr>
-          <p:cNvSpPr>
-            <a:spLocks noGrp="1"/>
-          </p:cNvSpPr>
-          <p:nvPr>
-            <p:ph idx="1"/>
-          </p:nvPr>
-        </p:nvSpPr>
-        <p:spPr/>
-        <p:txBody>
-          <a:bodyPr/>
-          <a:lstStyle/>
-          <a:p>
-            <a:endParaRPr lang="ko-KR" altLang="en-US"/>
-          </a:p>
-        </p:txBody>
-      </p:sp>
-    </p:spTree>
-    <p:extLst>
-      <p:ext uri="{BB962C8B-B14F-4D97-AF65-F5344CB8AC3E}">
-        <p14:creationId xmlns:p14="http://schemas.microsoft.com/office/powerpoint/2010/main" val="763408087"/>
       </p:ext>
     </p:extLst>
   </p:cSld>

</xml_diff>